<commit_message>
Updates to Reading List
</commit_message>
<xml_diff>
--- a/Lecture_notes_ppt/GEOG0125 Week 3 Lecture - Bayesian GAMs.pptx
+++ b/Lecture_notes_ppt/GEOG0125 Week 3 Lecture - Bayesian GAMs.pptx
@@ -6,7 +6,7 @@
     <p:sldMasterId id="2147483660" r:id="rId2"/>
   </p:sldMasterIdLst>
   <p:notesMasterIdLst>
-    <p:notesMasterId r:id="rId31"/>
+    <p:notesMasterId r:id="rId33"/>
   </p:notesMasterIdLst>
   <p:sldIdLst>
     <p:sldId id="420" r:id="rId3"/>
@@ -36,7 +36,9 @@
     <p:sldId id="1338" r:id="rId27"/>
     <p:sldId id="1339" r:id="rId28"/>
     <p:sldId id="1340" r:id="rId29"/>
-    <p:sldId id="1301" r:id="rId30"/>
+    <p:sldId id="1342" r:id="rId30"/>
+    <p:sldId id="1343" r:id="rId31"/>
+    <p:sldId id="1301" r:id="rId32"/>
   </p:sldIdLst>
   <p:sldSz cx="12192000" cy="6858000"/>
   <p:notesSz cx="6858000" cy="9144000"/>
@@ -251,7 +253,7 @@
           <a:p>
             <a:fld id="{B189E245-271D-FD48-BFBB-D05CACE4EE11}" type="datetimeFigureOut">
               <a:rPr lang="en-US" smtClean="0"/>
-              <a:t>1/27/23</a:t>
+              <a:t>1/22/24</a:t>
             </a:fld>
             <a:endParaRPr lang="en-US"/>
           </a:p>
@@ -2655,7 +2657,7 @@
           <a:p>
             <a:fld id="{2BB000D9-F882-5444-9F67-E68F2BDFFFE1}" type="datetimeFigureOut">
               <a:rPr lang="en-US" smtClean="0"/>
-              <a:t>1/27/23</a:t>
+              <a:t>1/22/24</a:t>
             </a:fld>
             <a:endParaRPr lang="en-US"/>
           </a:p>
@@ -2863,7 +2865,7 @@
           <a:p>
             <a:fld id="{2BB000D9-F882-5444-9F67-E68F2BDFFFE1}" type="datetimeFigureOut">
               <a:rPr lang="en-US" smtClean="0"/>
-              <a:t>1/27/23</a:t>
+              <a:t>1/22/24</a:t>
             </a:fld>
             <a:endParaRPr lang="en-US"/>
           </a:p>
@@ -3248,7 +3250,7 @@
           <a:p>
             <a:fld id="{C21145F5-A5E9-5F43-82CD-3B9BA6E3131E}" type="datetimeFigureOut">
               <a:rPr lang="en-US" smtClean="0"/>
-              <a:t>1/27/23</a:t>
+              <a:t>1/22/24</a:t>
             </a:fld>
             <a:endParaRPr lang="en-US"/>
           </a:p>
@@ -3456,7 +3458,7 @@
           <a:p>
             <a:fld id="{C21145F5-A5E9-5F43-82CD-3B9BA6E3131E}" type="datetimeFigureOut">
               <a:rPr lang="en-US" smtClean="0"/>
-              <a:t>1/27/23</a:t>
+              <a:t>1/22/24</a:t>
             </a:fld>
             <a:endParaRPr lang="en-US"/>
           </a:p>
@@ -3731,7 +3733,7 @@
           <a:p>
             <a:fld id="{C21145F5-A5E9-5F43-82CD-3B9BA6E3131E}" type="datetimeFigureOut">
               <a:rPr lang="en-US" smtClean="0"/>
-              <a:t>1/27/23</a:t>
+              <a:t>1/22/24</a:t>
             </a:fld>
             <a:endParaRPr lang="en-US"/>
           </a:p>
@@ -3998,7 +4000,7 @@
           <a:p>
             <a:fld id="{C21145F5-A5E9-5F43-82CD-3B9BA6E3131E}" type="datetimeFigureOut">
               <a:rPr lang="en-US" smtClean="0"/>
-              <a:t>1/27/23</a:t>
+              <a:t>1/22/24</a:t>
             </a:fld>
             <a:endParaRPr lang="en-US"/>
           </a:p>
@@ -4401,7 +4403,7 @@
           <a:p>
             <a:fld id="{C21145F5-A5E9-5F43-82CD-3B9BA6E3131E}" type="datetimeFigureOut">
               <a:rPr lang="en-US" smtClean="0"/>
-              <a:t>1/27/23</a:t>
+              <a:t>1/22/24</a:t>
             </a:fld>
             <a:endParaRPr lang="en-US"/>
           </a:p>
@@ -4550,7 +4552,7 @@
           <a:p>
             <a:fld id="{C21145F5-A5E9-5F43-82CD-3B9BA6E3131E}" type="datetimeFigureOut">
               <a:rPr lang="en-US" smtClean="0"/>
-              <a:t>1/27/23</a:t>
+              <a:t>1/22/24</a:t>
             </a:fld>
             <a:endParaRPr lang="en-US"/>
           </a:p>
@@ -4699,7 +4701,7 @@
           <a:p>
             <a:fld id="{C21145F5-A5E9-5F43-82CD-3B9BA6E3131E}" type="datetimeFigureOut">
               <a:rPr lang="en-US" smtClean="0"/>
-              <a:t>1/27/23</a:t>
+              <a:t>1/22/24</a:t>
             </a:fld>
             <a:endParaRPr lang="en-US"/>
           </a:p>
@@ -5007,7 +5009,7 @@
           <a:p>
             <a:fld id="{C21145F5-A5E9-5F43-82CD-3B9BA6E3131E}" type="datetimeFigureOut">
               <a:rPr lang="en-US" smtClean="0"/>
-              <a:t>1/27/23</a:t>
+              <a:t>1/22/24</a:t>
             </a:fld>
             <a:endParaRPr lang="en-US"/>
           </a:p>
@@ -5292,7 +5294,7 @@
           <a:p>
             <a:fld id="{C21145F5-A5E9-5F43-82CD-3B9BA6E3131E}" type="datetimeFigureOut">
               <a:rPr lang="en-US" smtClean="0"/>
-              <a:t>1/27/23</a:t>
+              <a:t>1/22/24</a:t>
             </a:fld>
             <a:endParaRPr lang="en-US"/>
           </a:p>
@@ -5500,7 +5502,7 @@
           <a:p>
             <a:fld id="{C21145F5-A5E9-5F43-82CD-3B9BA6E3131E}" type="datetimeFigureOut">
               <a:rPr lang="en-US" smtClean="0"/>
-              <a:t>1/27/23</a:t>
+              <a:t>1/22/24</a:t>
             </a:fld>
             <a:endParaRPr lang="en-US"/>
           </a:p>
@@ -5708,7 +5710,7 @@
           <a:p>
             <a:fld id="{C21145F5-A5E9-5F43-82CD-3B9BA6E3131E}" type="datetimeFigureOut">
               <a:rPr lang="en-US" smtClean="0"/>
-              <a:t>1/27/23</a:t>
+              <a:t>1/22/24</a:t>
             </a:fld>
             <a:endParaRPr lang="en-US"/>
           </a:p>
@@ -5983,7 +5985,7 @@
           <a:p>
             <a:fld id="{2BB000D9-F882-5444-9F67-E68F2BDFFFE1}" type="datetimeFigureOut">
               <a:rPr lang="en-US" smtClean="0"/>
-              <a:t>1/27/23</a:t>
+              <a:t>1/22/24</a:t>
             </a:fld>
             <a:endParaRPr lang="en-US"/>
           </a:p>
@@ -6250,7 +6252,7 @@
           <a:p>
             <a:fld id="{2BB000D9-F882-5444-9F67-E68F2BDFFFE1}" type="datetimeFigureOut">
               <a:rPr lang="en-US" smtClean="0"/>
-              <a:t>1/27/23</a:t>
+              <a:t>1/22/24</a:t>
             </a:fld>
             <a:endParaRPr lang="en-US"/>
           </a:p>
@@ -6653,7 +6655,7 @@
           <a:p>
             <a:fld id="{2BB000D9-F882-5444-9F67-E68F2BDFFFE1}" type="datetimeFigureOut">
               <a:rPr lang="en-US" smtClean="0"/>
-              <a:t>1/27/23</a:t>
+              <a:t>1/22/24</a:t>
             </a:fld>
             <a:endParaRPr lang="en-US"/>
           </a:p>
@@ -6802,7 +6804,7 @@
           <a:p>
             <a:fld id="{2BB000D9-F882-5444-9F67-E68F2BDFFFE1}" type="datetimeFigureOut">
               <a:rPr lang="en-US" smtClean="0"/>
-              <a:t>1/27/23</a:t>
+              <a:t>1/22/24</a:t>
             </a:fld>
             <a:endParaRPr lang="en-US"/>
           </a:p>
@@ -6921,7 +6923,7 @@
           <a:p>
             <a:fld id="{2BB000D9-F882-5444-9F67-E68F2BDFFFE1}" type="datetimeFigureOut">
               <a:rPr lang="en-US" smtClean="0"/>
-              <a:t>1/27/23</a:t>
+              <a:t>1/22/24</a:t>
             </a:fld>
             <a:endParaRPr lang="en-US"/>
           </a:p>
@@ -7229,7 +7231,7 @@
           <a:p>
             <a:fld id="{2BB000D9-F882-5444-9F67-E68F2BDFFFE1}" type="datetimeFigureOut">
               <a:rPr lang="en-US" smtClean="0"/>
-              <a:t>1/27/23</a:t>
+              <a:t>1/22/24</a:t>
             </a:fld>
             <a:endParaRPr lang="en-US"/>
           </a:p>
@@ -7514,7 +7516,7 @@
           <a:p>
             <a:fld id="{2BB000D9-F882-5444-9F67-E68F2BDFFFE1}" type="datetimeFigureOut">
               <a:rPr lang="en-US" smtClean="0"/>
-              <a:t>1/27/23</a:t>
+              <a:t>1/22/24</a:t>
             </a:fld>
             <a:endParaRPr lang="en-US"/>
           </a:p>
@@ -13947,8 +13949,8 @@
           </a:p>
         </p:txBody>
       </p:sp>
-      <mc:AlternateContent xmlns:mc="http://schemas.openxmlformats.org/markup-compatibility/2006" xmlns:a14="http://schemas.microsoft.com/office/drawing/2010/main">
-        <mc:Choice Requires="a14">
+      <mc:AlternateContent xmlns:mc="http://schemas.openxmlformats.org/markup-compatibility/2006">
+        <mc:Choice xmlns:a14="http://schemas.microsoft.com/office/drawing/2010/main" Requires="a14">
           <p:sp>
             <p:nvSpPr>
               <p:cNvPr id="6" name="TextBox 5">
@@ -14000,7 +14002,7 @@
                     <a:ea typeface="Helvetica Neue" panose="02000503000000020004" pitchFamily="2" charset="0"/>
                     <a:cs typeface="Helvetica Neue" panose="02000503000000020004" pitchFamily="2" charset="0"/>
                   </a:rPr>
-                  <a:t>Assessing the impact of COVID-19 lockdown and various sociodemographic factors on prevalence of mental health in the British population.</a:t>
+                  <a:t>Assessing the impact of COVID-19 lockdown phases and various sociodemographic factors on prevalence of mental health in the British population.</a:t>
                 </a:r>
               </a:p>
               <a:p>
@@ -14109,7 +14111,7 @@
             </p:txBody>
           </p:sp>
         </mc:Choice>
-        <mc:Fallback xmlns="">
+        <mc:Fallback>
           <p:sp>
             <p:nvSpPr>
               <p:cNvPr id="6" name="TextBox 5">
@@ -24364,7 +24366,7 @@
                 <a:ea typeface="Helvetica Neue Light" panose="02000403000000020004" pitchFamily="2" charset="0"/>
                 <a:cs typeface="Helvetica Neue" panose="02000503000000020004" pitchFamily="2" charset="0"/>
               </a:rPr>
-              <a:t>Importance: Notable applications in assessing or generating  “dose-response curve”</a:t>
+              <a:t>Importance: Notable applications in assessing or generating a so called “dose-response curve”</a:t>
             </a:r>
             <a:endParaRPr lang="en-US" sz="2000" kern="0" dirty="0">
               <a:solidFill>
@@ -25538,6 +25540,13 @@
                 <a:schemeClr val="lt1"/>
               </a:fontRef>
             </p:style>
+            <p:txBody>
+              <a:bodyPr/>
+              <a:lstStyle/>
+              <a:p>
+                <a:endParaRPr lang="en-GB"/>
+              </a:p>
+            </p:txBody>
           </p:sp>
           <p:sp>
             <p:nvSpPr>
@@ -25670,6 +25679,13 @@
                 <a:schemeClr val="lt1"/>
               </a:fontRef>
             </p:style>
+            <p:txBody>
+              <a:bodyPr/>
+              <a:lstStyle/>
+              <a:p>
+                <a:endParaRPr lang="en-GB"/>
+              </a:p>
+            </p:txBody>
           </p:sp>
           <p:sp>
             <p:nvSpPr>
@@ -25802,6 +25818,13 @@
                 <a:schemeClr val="lt1"/>
               </a:fontRef>
             </p:style>
+            <p:txBody>
+              <a:bodyPr/>
+              <a:lstStyle/>
+              <a:p>
+                <a:endParaRPr lang="en-GB"/>
+              </a:p>
+            </p:txBody>
           </p:sp>
           <p:sp>
             <p:nvSpPr>
@@ -25934,6 +25957,13 @@
                 <a:schemeClr val="lt1"/>
               </a:fontRef>
             </p:style>
+            <p:txBody>
+              <a:bodyPr/>
+              <a:lstStyle/>
+              <a:p>
+                <a:endParaRPr lang="en-GB"/>
+              </a:p>
+            </p:txBody>
           </p:sp>
           <p:sp>
             <p:nvSpPr>
@@ -26066,6 +26096,13 @@
                 <a:schemeClr val="lt1"/>
               </a:fontRef>
             </p:style>
+            <p:txBody>
+              <a:bodyPr/>
+              <a:lstStyle/>
+              <a:p>
+                <a:endParaRPr lang="en-GB"/>
+              </a:p>
+            </p:txBody>
           </p:sp>
           <p:sp>
             <p:nvSpPr>
@@ -26198,6 +26235,13 @@
                 <a:schemeClr val="lt1"/>
               </a:fontRef>
             </p:style>
+            <p:txBody>
+              <a:bodyPr/>
+              <a:lstStyle/>
+              <a:p>
+                <a:endParaRPr lang="en-GB"/>
+              </a:p>
+            </p:txBody>
           </p:sp>
           <p:sp>
             <p:nvSpPr>
@@ -27795,8 +27839,8 @@
         </p:nvSpPr>
         <p:spPr>
           <a:xfrm>
-            <a:off x="218661" y="107059"/>
-            <a:ext cx="10999242" cy="523220"/>
+            <a:off x="218660" y="107059"/>
+            <a:ext cx="11807435" cy="523220"/>
           </a:xfrm>
           <a:prstGeom prst="rect">
             <a:avLst/>
@@ -27815,7 +27859,7 @@
                 <a:latin typeface="Helvetica Neue Light" panose="02000403000000020004" pitchFamily="2" charset="0"/>
                 <a:ea typeface="Helvetica Neue Light" panose="02000403000000020004" pitchFamily="2" charset="0"/>
               </a:rPr>
-              <a:t>Example: Air quality and Respiratory admissions in Turin Province [1]</a:t>
+              <a:t>Example 1: Air quality and Respiratory admissions in Turin Province [1]</a:t>
             </a:r>
           </a:p>
         </p:txBody>
@@ -29274,8 +29318,8 @@
           </a:p>
         </p:txBody>
       </p:sp>
-      <mc:AlternateContent xmlns:mc="http://schemas.openxmlformats.org/markup-compatibility/2006" xmlns:a14="http://schemas.microsoft.com/office/drawing/2010/main">
-        <mc:Choice Requires="a14">
+      <mc:AlternateContent xmlns:mc="http://schemas.openxmlformats.org/markup-compatibility/2006">
+        <mc:Choice xmlns:a14="http://schemas.microsoft.com/office/drawing/2010/main" Requires="a14">
           <p:sp>
             <p:nvSpPr>
               <p:cNvPr id="28" name="TextBox 27">
@@ -29314,7 +29358,7 @@
                     <a:ea typeface="Helvetica Neue" panose="02000503000000020004" pitchFamily="2" charset="0"/>
                     <a:cs typeface="Helvetica Neue" panose="02000503000000020004" pitchFamily="2" charset="0"/>
                   </a:rPr>
-                  <a:t>Specify likelihood function. The outcome is counts – thus it Poisson, and we will use the </a:t>
+                  <a:t>Specify likelihood function. The outcome is counts – thus its Poisson, and we will use the </a:t>
                 </a:r>
                 <a14:m>
                   <m:oMath xmlns:m="http://schemas.openxmlformats.org/officeDocument/2006/math">
@@ -29351,7 +29395,7 @@
             </p:txBody>
           </p:sp>
         </mc:Choice>
-        <mc:Fallback xmlns="">
+        <mc:Fallback>
           <p:sp>
             <p:nvSpPr>
               <p:cNvPr id="28" name="TextBox 27">
@@ -29377,7 +29421,7 @@
               <a:blipFill>
                 <a:blip r:embed="rId5"/>
                 <a:stretch>
-                  <a:fillRect l="-578" t="-1923" r="-193" b="-15385"/>
+                  <a:fillRect l="-578" t="-1923" b="-15385"/>
                 </a:stretch>
               </a:blipFill>
             </p:spPr>
@@ -30213,7 +30257,7 @@
         <p:spPr>
           <a:xfrm>
             <a:off x="218661" y="107059"/>
-            <a:ext cx="9611139" cy="523220"/>
+            <a:ext cx="10406898" cy="523220"/>
           </a:xfrm>
           <a:prstGeom prst="rect">
             <a:avLst/>
@@ -30232,7 +30276,7 @@
                 <a:latin typeface="Helvetica Neue Light" panose="02000403000000020004" pitchFamily="2" charset="0"/>
                 <a:ea typeface="Helvetica Neue Light" panose="02000403000000020004" pitchFamily="2" charset="0"/>
               </a:rPr>
-              <a:t>Example: Air quality and Mortality in Chicago (1987-2000) [2]</a:t>
+              <a:t>Example 1: Air quality and Mortality in Chicago (1987-2000) [2]</a:t>
             </a:r>
           </a:p>
         </p:txBody>
@@ -31639,6 +31683,62 @@
           </a:p>
         </p:txBody>
       </p:sp>
+      <p:sp>
+        <p:nvSpPr>
+          <p:cNvPr id="11" name="TextBox 10">
+            <a:extLst>
+              <a:ext uri="{FF2B5EF4-FFF2-40B4-BE49-F238E27FC236}">
+                <a16:creationId xmlns:a16="http://schemas.microsoft.com/office/drawing/2014/main" id="{99EB737F-129F-FA61-F10D-79A8E52757AC}"/>
+              </a:ext>
+            </a:extLst>
+          </p:cNvPr>
+          <p:cNvSpPr txBox="1"/>
+          <p:nvPr/>
+        </p:nvSpPr>
+        <p:spPr>
+          <a:xfrm>
+            <a:off x="218661" y="4386805"/>
+            <a:ext cx="5391604" cy="923330"/>
+          </a:xfrm>
+          <a:prstGeom prst="rect">
+            <a:avLst/>
+          </a:prstGeom>
+          <a:noFill/>
+        </p:spPr>
+        <p:txBody>
+          <a:bodyPr wrap="none" rtlCol="0">
+            <a:spAutoFit/>
+          </a:bodyPr>
+          <a:lstStyle/>
+          <a:p>
+            <a:r>
+              <a:rPr lang="en-GB" dirty="0">
+                <a:latin typeface="Arial" panose="020B0604020202020204" pitchFamily="34" charset="0"/>
+                <a:cs typeface="Arial" panose="020B0604020202020204" pitchFamily="34" charset="0"/>
+              </a:rPr>
+              <a:t>This time around the coding is a lot easier. You can</a:t>
+            </a:r>
+          </a:p>
+          <a:p>
+            <a:r>
+              <a:rPr lang="en-GB" dirty="0">
+                <a:latin typeface="Arial" panose="020B0604020202020204" pitchFamily="34" charset="0"/>
+                <a:cs typeface="Arial" panose="020B0604020202020204" pitchFamily="34" charset="0"/>
+              </a:rPr>
+              <a:t>use this as an alternative option to writing raw Stan</a:t>
+            </a:r>
+          </a:p>
+          <a:p>
+            <a:r>
+              <a:rPr lang="en-GB" dirty="0">
+                <a:latin typeface="Arial" panose="020B0604020202020204" pitchFamily="34" charset="0"/>
+                <a:cs typeface="Arial" panose="020B0604020202020204" pitchFamily="34" charset="0"/>
+              </a:rPr>
+              <a:t>code.</a:t>
+            </a:r>
+          </a:p>
+        </p:txBody>
+      </p:sp>
     </p:spTree>
     <p:extLst>
       <p:ext uri="{BB962C8B-B14F-4D97-AF65-F5344CB8AC3E}">
@@ -31684,7 +31784,7 @@
         <p:spPr>
           <a:xfrm>
             <a:off x="218661" y="107059"/>
-            <a:ext cx="9611139" cy="523220"/>
+            <a:ext cx="10198554" cy="523220"/>
           </a:xfrm>
           <a:prstGeom prst="rect">
             <a:avLst/>
@@ -31703,7 +31803,7 @@
                 <a:latin typeface="Helvetica Neue Light" panose="02000403000000020004" pitchFamily="2" charset="0"/>
                 <a:ea typeface="Helvetica Neue Light" panose="02000403000000020004" pitchFamily="2" charset="0"/>
               </a:rPr>
-              <a:t>Example: Air quality and Mortality in Chicago (1987-2000) [2]</a:t>
+              <a:t>Example 1: Air quality and Mortality in Chicago (1987-2000) [2]</a:t>
             </a:r>
           </a:p>
         </p:txBody>
@@ -32573,8 +32673,8 @@
           </a:p>
         </p:txBody>
       </p:sp>
-      <mc:AlternateContent xmlns:mc="http://schemas.openxmlformats.org/markup-compatibility/2006">
-        <mc:Choice xmlns:a14="http://schemas.microsoft.com/office/drawing/2010/main" Requires="a14">
+      <mc:AlternateContent xmlns:mc="http://schemas.openxmlformats.org/markup-compatibility/2006" xmlns:a14="http://schemas.microsoft.com/office/drawing/2010/main">
+        <mc:Choice Requires="a14">
           <p:graphicFrame>
             <p:nvGraphicFramePr>
               <p:cNvPr id="6" name="Table 3">
@@ -33011,7 +33111,7 @@
             </a:graphic>
           </p:graphicFrame>
         </mc:Choice>
-        <mc:Fallback>
+        <mc:Fallback xmlns="">
           <p:graphicFrame>
             <p:nvGraphicFramePr>
               <p:cNvPr id="6" name="Table 3">
@@ -35532,6 +35632,1075 @@
 </file>
 
 <file path=ppt/slides/slide28.xml><?xml version="1.0" encoding="utf-8"?>
+<p:sld xmlns:a="http://schemas.openxmlformats.org/drawingml/2006/main" xmlns:r="http://schemas.openxmlformats.org/officeDocument/2006/relationships" xmlns:p="http://schemas.openxmlformats.org/presentationml/2006/main">
+  <p:cSld>
+    <p:spTree>
+      <p:nvGrpSpPr>
+        <p:cNvPr id="1" name=""/>
+        <p:cNvGrpSpPr/>
+        <p:nvPr/>
+      </p:nvGrpSpPr>
+      <p:grpSpPr>
+        <a:xfrm>
+          <a:off x="0" y="0"/>
+          <a:ext cx="0" cy="0"/>
+          <a:chOff x="0" y="0"/>
+          <a:chExt cx="0" cy="0"/>
+        </a:xfrm>
+      </p:grpSpPr>
+      <p:sp>
+        <p:nvSpPr>
+          <p:cNvPr id="2" name="Slide Number Placeholder 3">
+            <a:extLst>
+              <a:ext uri="{FF2B5EF4-FFF2-40B4-BE49-F238E27FC236}">
+                <a16:creationId xmlns:a16="http://schemas.microsoft.com/office/drawing/2014/main" id="{B5AF1D51-FE98-98A2-8556-FB15F38E0575}"/>
+              </a:ext>
+            </a:extLst>
+          </p:cNvPr>
+          <p:cNvSpPr txBox="1">
+            <a:spLocks/>
+          </p:cNvSpPr>
+          <p:nvPr/>
+        </p:nvSpPr>
+        <p:spPr>
+          <a:xfrm>
+            <a:off x="11652000" y="6439971"/>
+            <a:ext cx="540000" cy="144000"/>
+          </a:xfrm>
+          <a:prstGeom prst="rect">
+            <a:avLst/>
+          </a:prstGeom>
+        </p:spPr>
+        <p:txBody>
+          <a:bodyPr/>
+          <a:lstStyle>
+            <a:defPPr>
+              <a:defRPr lang="en-US"/>
+            </a:defPPr>
+            <a:lvl1pPr marL="0" algn="l" defTabSz="914400" rtl="0" eaLnBrk="1" latinLnBrk="0" hangingPunct="1">
+              <a:defRPr sz="1800" kern="1200">
+                <a:solidFill>
+                  <a:schemeClr val="tx1"/>
+                </a:solidFill>
+                <a:latin typeface="+mn-lt"/>
+                <a:ea typeface="+mn-ea"/>
+                <a:cs typeface="+mn-cs"/>
+              </a:defRPr>
+            </a:lvl1pPr>
+            <a:lvl2pPr marL="457200" algn="l" defTabSz="914400" rtl="0" eaLnBrk="1" latinLnBrk="0" hangingPunct="1">
+              <a:defRPr sz="1800" kern="1200">
+                <a:solidFill>
+                  <a:schemeClr val="tx1"/>
+                </a:solidFill>
+                <a:latin typeface="+mn-lt"/>
+                <a:ea typeface="+mn-ea"/>
+                <a:cs typeface="+mn-cs"/>
+              </a:defRPr>
+            </a:lvl2pPr>
+            <a:lvl3pPr marL="914400" algn="l" defTabSz="914400" rtl="0" eaLnBrk="1" latinLnBrk="0" hangingPunct="1">
+              <a:defRPr sz="1800" kern="1200">
+                <a:solidFill>
+                  <a:schemeClr val="tx1"/>
+                </a:solidFill>
+                <a:latin typeface="+mn-lt"/>
+                <a:ea typeface="+mn-ea"/>
+                <a:cs typeface="+mn-cs"/>
+              </a:defRPr>
+            </a:lvl3pPr>
+            <a:lvl4pPr marL="1371600" algn="l" defTabSz="914400" rtl="0" eaLnBrk="1" latinLnBrk="0" hangingPunct="1">
+              <a:defRPr sz="1800" kern="1200">
+                <a:solidFill>
+                  <a:schemeClr val="tx1"/>
+                </a:solidFill>
+                <a:latin typeface="+mn-lt"/>
+                <a:ea typeface="+mn-ea"/>
+                <a:cs typeface="+mn-cs"/>
+              </a:defRPr>
+            </a:lvl4pPr>
+            <a:lvl5pPr marL="1828800" algn="l" defTabSz="914400" rtl="0" eaLnBrk="1" latinLnBrk="0" hangingPunct="1">
+              <a:defRPr sz="1800" kern="1200">
+                <a:solidFill>
+                  <a:schemeClr val="tx1"/>
+                </a:solidFill>
+                <a:latin typeface="+mn-lt"/>
+                <a:ea typeface="+mn-ea"/>
+                <a:cs typeface="+mn-cs"/>
+              </a:defRPr>
+            </a:lvl5pPr>
+            <a:lvl6pPr marL="2286000" algn="l" defTabSz="914400" rtl="0" eaLnBrk="1" latinLnBrk="0" hangingPunct="1">
+              <a:defRPr sz="1800" kern="1200">
+                <a:solidFill>
+                  <a:schemeClr val="tx1"/>
+                </a:solidFill>
+                <a:latin typeface="+mn-lt"/>
+                <a:ea typeface="+mn-ea"/>
+                <a:cs typeface="+mn-cs"/>
+              </a:defRPr>
+            </a:lvl6pPr>
+            <a:lvl7pPr marL="2743200" algn="l" defTabSz="914400" rtl="0" eaLnBrk="1" latinLnBrk="0" hangingPunct="1">
+              <a:defRPr sz="1800" kern="1200">
+                <a:solidFill>
+                  <a:schemeClr val="tx1"/>
+                </a:solidFill>
+                <a:latin typeface="+mn-lt"/>
+                <a:ea typeface="+mn-ea"/>
+                <a:cs typeface="+mn-cs"/>
+              </a:defRPr>
+            </a:lvl7pPr>
+            <a:lvl8pPr marL="3200400" algn="l" defTabSz="914400" rtl="0" eaLnBrk="1" latinLnBrk="0" hangingPunct="1">
+              <a:defRPr sz="1800" kern="1200">
+                <a:solidFill>
+                  <a:schemeClr val="tx1"/>
+                </a:solidFill>
+                <a:latin typeface="+mn-lt"/>
+                <a:ea typeface="+mn-ea"/>
+                <a:cs typeface="+mn-cs"/>
+              </a:defRPr>
+            </a:lvl8pPr>
+            <a:lvl9pPr marL="3657600" algn="l" defTabSz="914400" rtl="0" eaLnBrk="1" latinLnBrk="0" hangingPunct="1">
+              <a:defRPr sz="1800" kern="1200">
+                <a:solidFill>
+                  <a:schemeClr val="tx1"/>
+                </a:solidFill>
+                <a:latin typeface="+mn-lt"/>
+                <a:ea typeface="+mn-ea"/>
+                <a:cs typeface="+mn-cs"/>
+              </a:defRPr>
+            </a:lvl9pPr>
+          </a:lstStyle>
+          <a:p>
+            <a:fld id="{6C21D7B2-F6DF-4749-BE48-6DFE0A2356E7}" type="slidenum">
+              <a:rPr lang="en-US" altLang="x-none" smtClean="0">
+                <a:latin typeface="Helvetica Neue" panose="02000503000000020004" pitchFamily="2" charset="0"/>
+                <a:ea typeface="Helvetica Neue" panose="02000503000000020004" pitchFamily="2" charset="0"/>
+                <a:cs typeface="Helvetica Neue" panose="02000503000000020004" pitchFamily="2" charset="0"/>
+              </a:rPr>
+              <a:pPr/>
+              <a:t>28</a:t>
+            </a:fld>
+            <a:endParaRPr lang="en-US" altLang="x-none" dirty="0">
+              <a:latin typeface="Helvetica Neue" panose="02000503000000020004" pitchFamily="2" charset="0"/>
+              <a:ea typeface="Helvetica Neue" panose="02000503000000020004" pitchFamily="2" charset="0"/>
+              <a:cs typeface="Helvetica Neue" panose="02000503000000020004" pitchFamily="2" charset="0"/>
+            </a:endParaRPr>
+          </a:p>
+        </p:txBody>
+      </p:sp>
+      <p:sp>
+        <p:nvSpPr>
+          <p:cNvPr id="3" name="TextBox 2">
+            <a:extLst>
+              <a:ext uri="{FF2B5EF4-FFF2-40B4-BE49-F238E27FC236}">
+                <a16:creationId xmlns:a16="http://schemas.microsoft.com/office/drawing/2014/main" id="{ADF2B3FD-AE0D-A078-822B-5E3E9A7F73A8}"/>
+              </a:ext>
+            </a:extLst>
+          </p:cNvPr>
+          <p:cNvSpPr txBox="1"/>
+          <p:nvPr/>
+        </p:nvSpPr>
+        <p:spPr>
+          <a:xfrm>
+            <a:off x="218661" y="107059"/>
+            <a:ext cx="10198554" cy="954107"/>
+          </a:xfrm>
+          <a:prstGeom prst="rect">
+            <a:avLst/>
+          </a:prstGeom>
+          <a:noFill/>
+        </p:spPr>
+        <p:txBody>
+          <a:bodyPr wrap="square" rtlCol="0">
+            <a:spAutoFit/>
+          </a:bodyPr>
+          <a:lstStyle/>
+          <a:p>
+            <a:pPr algn="l"/>
+            <a:r>
+              <a:rPr lang="en-GB" sz="2800" b="1" dirty="0">
+                <a:latin typeface="Helvetica Neue Light" panose="02000403000000020004" pitchFamily="2" charset="0"/>
+                <a:ea typeface="Helvetica Neue Light" panose="02000403000000020004" pitchFamily="2" charset="0"/>
+              </a:rPr>
+              <a:t>Example 2: COVID-19 lockdown phases and impact on crime resurgence in Nottingham (Antisocial Behaviour [ASB])</a:t>
+            </a:r>
+          </a:p>
+        </p:txBody>
+      </p:sp>
+      <p:pic>
+        <p:nvPicPr>
+          <p:cNvPr id="5" name="Picture 4" descr="A diagram of a timeline&#10;&#10;Description automatically generated with medium confidence">
+            <a:extLst>
+              <a:ext uri="{FF2B5EF4-FFF2-40B4-BE49-F238E27FC236}">
+                <a16:creationId xmlns:a16="http://schemas.microsoft.com/office/drawing/2014/main" id="{DD829BC2-11EE-5DFD-AA26-87C131A97C35}"/>
+              </a:ext>
+            </a:extLst>
+          </p:cNvPr>
+          <p:cNvPicPr>
+            <a:picLocks noChangeAspect="1"/>
+          </p:cNvPicPr>
+          <p:nvPr/>
+        </p:nvPicPr>
+        <p:blipFill>
+          <a:blip r:embed="rId2"/>
+          <a:stretch>
+            <a:fillRect/>
+          </a:stretch>
+        </p:blipFill>
+        <p:spPr>
+          <a:xfrm>
+            <a:off x="129569" y="1399750"/>
+            <a:ext cx="11932862" cy="2987065"/>
+          </a:xfrm>
+          <a:prstGeom prst="rect">
+            <a:avLst/>
+          </a:prstGeom>
+        </p:spPr>
+      </p:pic>
+      <p:sp>
+        <p:nvSpPr>
+          <p:cNvPr id="7" name="TextBox 6">
+            <a:extLst>
+              <a:ext uri="{FF2B5EF4-FFF2-40B4-BE49-F238E27FC236}">
+                <a16:creationId xmlns:a16="http://schemas.microsoft.com/office/drawing/2014/main" id="{5A5847F6-4735-AE48-B4F3-8AFED2FC79AF}"/>
+              </a:ext>
+            </a:extLst>
+          </p:cNvPr>
+          <p:cNvSpPr txBox="1"/>
+          <p:nvPr/>
+        </p:nvSpPr>
+        <p:spPr>
+          <a:xfrm>
+            <a:off x="218661" y="4443896"/>
+            <a:ext cx="11705115" cy="923330"/>
+          </a:xfrm>
+          <a:prstGeom prst="rect">
+            <a:avLst/>
+          </a:prstGeom>
+          <a:noFill/>
+        </p:spPr>
+        <p:txBody>
+          <a:bodyPr wrap="square" rtlCol="0">
+            <a:spAutoFit/>
+          </a:bodyPr>
+          <a:lstStyle/>
+          <a:p>
+            <a:pPr marL="285750" indent="-285750">
+              <a:buFont typeface="Arial" panose="020B0604020202020204" pitchFamily="34" charset="0"/>
+              <a:buChar char="•"/>
+            </a:pPr>
+            <a:r>
+              <a:rPr lang="en-GB" dirty="0">
+                <a:latin typeface="Arial" panose="020B0604020202020204" pitchFamily="34" charset="0"/>
+                <a:cs typeface="Arial" panose="020B0604020202020204" pitchFamily="34" charset="0"/>
+              </a:rPr>
+              <a:t>Understand the crime recovery patterns in-between the lockdown phases in Nottingham across all 182 LSOAs.</a:t>
+            </a:r>
+          </a:p>
+          <a:p>
+            <a:pPr marL="285750" indent="-285750">
+              <a:buFont typeface="Arial" panose="020B0604020202020204" pitchFamily="34" charset="0"/>
+              <a:buChar char="•"/>
+            </a:pPr>
+            <a:r>
+              <a:rPr lang="en-GB" dirty="0">
+                <a:latin typeface="Arial" panose="020B0604020202020204" pitchFamily="34" charset="0"/>
+                <a:cs typeface="Arial" panose="020B0604020202020204" pitchFamily="34" charset="0"/>
+              </a:rPr>
+              <a:t>To examine whether or not these ASB patterns were statistically significant. Hence a stratified Poisson GAM model was used </a:t>
+            </a:r>
+          </a:p>
+        </p:txBody>
+      </p:sp>
+      <p:sp>
+        <p:nvSpPr>
+          <p:cNvPr id="8" name="TextBox 7">
+            <a:extLst>
+              <a:ext uri="{FF2B5EF4-FFF2-40B4-BE49-F238E27FC236}">
+                <a16:creationId xmlns:a16="http://schemas.microsoft.com/office/drawing/2014/main" id="{CDBA721D-3AF2-6B25-9BF1-611C2985FDC9}"/>
+              </a:ext>
+            </a:extLst>
+          </p:cNvPr>
+          <p:cNvSpPr txBox="1"/>
+          <p:nvPr/>
+        </p:nvSpPr>
+        <p:spPr>
+          <a:xfrm>
+            <a:off x="218661" y="5641988"/>
+            <a:ext cx="8449851" cy="738664"/>
+          </a:xfrm>
+          <a:prstGeom prst="rect">
+            <a:avLst/>
+          </a:prstGeom>
+          <a:solidFill>
+            <a:schemeClr val="accent1">
+              <a:lumMod val="20000"/>
+              <a:lumOff val="80000"/>
+            </a:schemeClr>
+          </a:solidFill>
+        </p:spPr>
+        <p:txBody>
+          <a:bodyPr wrap="square" rtlCol="0">
+            <a:spAutoFit/>
+          </a:bodyPr>
+          <a:lstStyle/>
+          <a:p>
+            <a:r>
+              <a:rPr lang="en-GB" sz="1400" dirty="0">
+                <a:latin typeface="Arial" panose="020B0604020202020204" pitchFamily="34" charset="0"/>
+                <a:cs typeface="Arial" panose="020B0604020202020204" pitchFamily="34" charset="0"/>
+              </a:rPr>
+              <a:t>Gehui Qi (2023) Investigating the Crime Recovery Patterns in Nottingham in the Post-Lockdown Period using Social Disorganisation Theory. UCL Undergraduate Dissertation 2022/23. Department of Geography. Submitted BA Geography with Social Data Sciences. </a:t>
+            </a:r>
+            <a:r>
+              <a:rPr lang="en-GB" sz="1400" b="1" dirty="0">
+                <a:latin typeface="Arial" panose="020B0604020202020204" pitchFamily="34" charset="0"/>
+                <a:cs typeface="Arial" panose="020B0604020202020204" pitchFamily="34" charset="0"/>
+              </a:rPr>
+              <a:t>Download: [Click]</a:t>
+            </a:r>
+          </a:p>
+        </p:txBody>
+      </p:sp>
+      <p:sp>
+        <p:nvSpPr>
+          <p:cNvPr id="9" name="TextBox 8">
+            <a:extLst>
+              <a:ext uri="{FF2B5EF4-FFF2-40B4-BE49-F238E27FC236}">
+                <a16:creationId xmlns:a16="http://schemas.microsoft.com/office/drawing/2014/main" id="{CEF6468C-C70E-B793-85E7-55AB03956184}"/>
+              </a:ext>
+            </a:extLst>
+          </p:cNvPr>
+          <p:cNvSpPr txBox="1"/>
+          <p:nvPr/>
+        </p:nvSpPr>
+        <p:spPr>
+          <a:xfrm>
+            <a:off x="218661" y="6399305"/>
+            <a:ext cx="5397631" cy="307777"/>
+          </a:xfrm>
+          <a:prstGeom prst="rect">
+            <a:avLst/>
+          </a:prstGeom>
+          <a:noFill/>
+        </p:spPr>
+        <p:txBody>
+          <a:bodyPr wrap="none" rtlCol="0">
+            <a:spAutoFit/>
+          </a:bodyPr>
+          <a:lstStyle/>
+          <a:p>
+            <a:r>
+              <a:rPr lang="en-GB" sz="1400" dirty="0">
+                <a:latin typeface="Arial" panose="020B0604020202020204" pitchFamily="34" charset="0"/>
+                <a:cs typeface="Arial" panose="020B0604020202020204" pitchFamily="34" charset="0"/>
+              </a:rPr>
+              <a:t>Data Repository: </a:t>
+            </a:r>
+            <a:r>
+              <a:rPr lang="en-GB" sz="1400" dirty="0">
+                <a:latin typeface="Arial" panose="020B0604020202020204" pitchFamily="34" charset="0"/>
+                <a:cs typeface="Arial" panose="020B0604020202020204" pitchFamily="34" charset="0"/>
+                <a:hlinkClick r:id="rId3"/>
+              </a:rPr>
+              <a:t>https://github.com/qghuihuihui/Dissertation-2023</a:t>
+            </a:r>
+            <a:r>
+              <a:rPr lang="en-GB" sz="1400" dirty="0">
+                <a:latin typeface="Arial" panose="020B0604020202020204" pitchFamily="34" charset="0"/>
+                <a:cs typeface="Arial" panose="020B0604020202020204" pitchFamily="34" charset="0"/>
+              </a:rPr>
+              <a:t> </a:t>
+            </a:r>
+          </a:p>
+        </p:txBody>
+      </p:sp>
+    </p:spTree>
+    <p:extLst>
+      <p:ext uri="{BB962C8B-B14F-4D97-AF65-F5344CB8AC3E}">
+        <p14:creationId xmlns:p14="http://schemas.microsoft.com/office/powerpoint/2010/main" val="4167375626"/>
+      </p:ext>
+    </p:extLst>
+  </p:cSld>
+  <p:clrMapOvr>
+    <a:masterClrMapping/>
+  </p:clrMapOvr>
+</p:sld>
+</file>
+
+<file path=ppt/slides/slide29.xml><?xml version="1.0" encoding="utf-8"?>
+<p:sld xmlns:a="http://schemas.openxmlformats.org/drawingml/2006/main" xmlns:r="http://schemas.openxmlformats.org/officeDocument/2006/relationships" xmlns:p="http://schemas.openxmlformats.org/presentationml/2006/main">
+  <p:cSld>
+    <p:spTree>
+      <p:nvGrpSpPr>
+        <p:cNvPr id="1" name=""/>
+        <p:cNvGrpSpPr/>
+        <p:nvPr/>
+      </p:nvGrpSpPr>
+      <p:grpSpPr>
+        <a:xfrm>
+          <a:off x="0" y="0"/>
+          <a:ext cx="0" cy="0"/>
+          <a:chOff x="0" y="0"/>
+          <a:chExt cx="0" cy="0"/>
+        </a:xfrm>
+      </p:grpSpPr>
+      <p:pic>
+        <p:nvPicPr>
+          <p:cNvPr id="2" name="Picture 1" descr="A diagram of a timeline&#10;&#10;Description automatically generated with medium confidence">
+            <a:extLst>
+              <a:ext uri="{FF2B5EF4-FFF2-40B4-BE49-F238E27FC236}">
+                <a16:creationId xmlns:a16="http://schemas.microsoft.com/office/drawing/2014/main" id="{0584E6D7-2835-682A-3F00-7346C1BCA8D1}"/>
+              </a:ext>
+            </a:extLst>
+          </p:cNvPr>
+          <p:cNvPicPr>
+            <a:picLocks noChangeAspect="1"/>
+          </p:cNvPicPr>
+          <p:nvPr/>
+        </p:nvPicPr>
+        <p:blipFill>
+          <a:blip r:embed="rId2"/>
+          <a:stretch>
+            <a:fillRect/>
+          </a:stretch>
+        </p:blipFill>
+        <p:spPr>
+          <a:xfrm>
+            <a:off x="853440" y="770439"/>
+            <a:ext cx="4242816" cy="1062073"/>
+          </a:xfrm>
+          <a:prstGeom prst="rect">
+            <a:avLst/>
+          </a:prstGeom>
+        </p:spPr>
+      </p:pic>
+      <p:pic>
+        <p:nvPicPr>
+          <p:cNvPr id="4" name="Picture 3" descr="A graph of a graph&#10;&#10;Description automatically generated with medium confidence">
+            <a:extLst>
+              <a:ext uri="{FF2B5EF4-FFF2-40B4-BE49-F238E27FC236}">
+                <a16:creationId xmlns:a16="http://schemas.microsoft.com/office/drawing/2014/main" id="{DE7ACC01-E01E-A7C4-7309-86A59A3732AC}"/>
+              </a:ext>
+            </a:extLst>
+          </p:cNvPr>
+          <p:cNvPicPr>
+            <a:picLocks noChangeAspect="1"/>
+          </p:cNvPicPr>
+          <p:nvPr/>
+        </p:nvPicPr>
+        <p:blipFill>
+          <a:blip r:embed="rId3"/>
+          <a:stretch>
+            <a:fillRect/>
+          </a:stretch>
+        </p:blipFill>
+        <p:spPr>
+          <a:xfrm>
+            <a:off x="0" y="1832512"/>
+            <a:ext cx="5627558" cy="3233674"/>
+          </a:xfrm>
+          <a:prstGeom prst="rect">
+            <a:avLst/>
+          </a:prstGeom>
+        </p:spPr>
+      </p:pic>
+      <p:sp>
+        <p:nvSpPr>
+          <p:cNvPr id="5" name="TextBox 4">
+            <a:extLst>
+              <a:ext uri="{FF2B5EF4-FFF2-40B4-BE49-F238E27FC236}">
+                <a16:creationId xmlns:a16="http://schemas.microsoft.com/office/drawing/2014/main" id="{C23FE1BB-698B-C872-068D-A4DF7077F11C}"/>
+              </a:ext>
+            </a:extLst>
+          </p:cNvPr>
+          <p:cNvSpPr txBox="1"/>
+          <p:nvPr/>
+        </p:nvSpPr>
+        <p:spPr>
+          <a:xfrm rot="16200000">
+            <a:off x="-1090651" y="3039461"/>
+            <a:ext cx="2489079" cy="307777"/>
+          </a:xfrm>
+          <a:prstGeom prst="rect">
+            <a:avLst/>
+          </a:prstGeom>
+          <a:solidFill>
+            <a:schemeClr val="bg1"/>
+          </a:solidFill>
+        </p:spPr>
+        <p:txBody>
+          <a:bodyPr wrap="none" rtlCol="0">
+            <a:spAutoFit/>
+          </a:bodyPr>
+          <a:lstStyle/>
+          <a:p>
+            <a:r>
+              <a:rPr lang="en-GB" sz="1400" dirty="0"/>
+              <a:t>Change in incidence rate of ASB</a:t>
+            </a:r>
+          </a:p>
+        </p:txBody>
+      </p:sp>
+      <p:sp>
+        <p:nvSpPr>
+          <p:cNvPr id="6" name="TextBox 5">
+            <a:extLst>
+              <a:ext uri="{FF2B5EF4-FFF2-40B4-BE49-F238E27FC236}">
+                <a16:creationId xmlns:a16="http://schemas.microsoft.com/office/drawing/2014/main" id="{F7633DD3-1D14-029C-CABC-18F7B8CBF618}"/>
+              </a:ext>
+            </a:extLst>
+          </p:cNvPr>
+          <p:cNvSpPr txBox="1"/>
+          <p:nvPr/>
+        </p:nvSpPr>
+        <p:spPr>
+          <a:xfrm>
+            <a:off x="1044961" y="4758409"/>
+            <a:ext cx="3537635" cy="307777"/>
+          </a:xfrm>
+          <a:prstGeom prst="rect">
+            <a:avLst/>
+          </a:prstGeom>
+          <a:solidFill>
+            <a:schemeClr val="bg1"/>
+          </a:solidFill>
+        </p:spPr>
+        <p:txBody>
+          <a:bodyPr wrap="none" rtlCol="0">
+            <a:spAutoFit/>
+          </a:bodyPr>
+          <a:lstStyle/>
+          <a:p>
+            <a:r>
+              <a:rPr lang="en-GB" sz="1400" dirty="0"/>
+              <a:t>Effect on COVID-19 Lockdown phase (Months)</a:t>
+            </a:r>
+          </a:p>
+        </p:txBody>
+      </p:sp>
+      <p:pic>
+        <p:nvPicPr>
+          <p:cNvPr id="8" name="Picture 7" descr="A map of different colored areas&#10;&#10;Description automatically generated with medium confidence">
+            <a:extLst>
+              <a:ext uri="{FF2B5EF4-FFF2-40B4-BE49-F238E27FC236}">
+                <a16:creationId xmlns:a16="http://schemas.microsoft.com/office/drawing/2014/main" id="{475DC974-6FC8-5F7D-BE0C-F84C00433F58}"/>
+              </a:ext>
+            </a:extLst>
+          </p:cNvPr>
+          <p:cNvPicPr>
+            <a:picLocks noChangeAspect="1"/>
+          </p:cNvPicPr>
+          <p:nvPr/>
+        </p:nvPicPr>
+        <p:blipFill>
+          <a:blip r:embed="rId4"/>
+          <a:stretch>
+            <a:fillRect/>
+          </a:stretch>
+        </p:blipFill>
+        <p:spPr>
+          <a:xfrm>
+            <a:off x="5519507" y="743713"/>
+            <a:ext cx="6526190" cy="4511039"/>
+          </a:xfrm>
+          <a:prstGeom prst="rect">
+            <a:avLst/>
+          </a:prstGeom>
+        </p:spPr>
+      </p:pic>
+      <p:sp>
+        <p:nvSpPr>
+          <p:cNvPr id="9" name="TextBox 8">
+            <a:extLst>
+              <a:ext uri="{FF2B5EF4-FFF2-40B4-BE49-F238E27FC236}">
+                <a16:creationId xmlns:a16="http://schemas.microsoft.com/office/drawing/2014/main" id="{630D1FB3-E0B2-E78C-EF63-DBB31FB97E02}"/>
+              </a:ext>
+            </a:extLst>
+          </p:cNvPr>
+          <p:cNvSpPr txBox="1"/>
+          <p:nvPr/>
+        </p:nvSpPr>
+        <p:spPr>
+          <a:xfrm>
+            <a:off x="153887" y="5614889"/>
+            <a:ext cx="5319781" cy="954107"/>
+          </a:xfrm>
+          <a:prstGeom prst="rect">
+            <a:avLst/>
+          </a:prstGeom>
+          <a:noFill/>
+        </p:spPr>
+        <p:txBody>
+          <a:bodyPr wrap="square" rtlCol="0">
+            <a:spAutoFit/>
+          </a:bodyPr>
+          <a:lstStyle/>
+          <a:p>
+            <a:r>
+              <a:rPr lang="en-GB" sz="1400" dirty="0">
+                <a:latin typeface="Arial" panose="020B0604020202020204" pitchFamily="34" charset="0"/>
+                <a:cs typeface="Arial" panose="020B0604020202020204" pitchFamily="34" charset="0"/>
+              </a:rPr>
+              <a:t>A series of Poisson GAMs were implemented on each LSOAs. 182 GAM plots were generated for each LSOA which had patterns showing the effect of lockdown (months) on changes in incidences of ASB.</a:t>
+            </a:r>
+          </a:p>
+        </p:txBody>
+      </p:sp>
+      <p:sp>
+        <p:nvSpPr>
+          <p:cNvPr id="10" name="TextBox 9">
+            <a:extLst>
+              <a:ext uri="{FF2B5EF4-FFF2-40B4-BE49-F238E27FC236}">
+                <a16:creationId xmlns:a16="http://schemas.microsoft.com/office/drawing/2014/main" id="{4E703BC4-588D-462E-1017-EE1500E6CBA5}"/>
+              </a:ext>
+            </a:extLst>
+          </p:cNvPr>
+          <p:cNvSpPr txBox="1"/>
+          <p:nvPr/>
+        </p:nvSpPr>
+        <p:spPr>
+          <a:xfrm>
+            <a:off x="5627558" y="5614889"/>
+            <a:ext cx="5881690" cy="954107"/>
+          </a:xfrm>
+          <a:prstGeom prst="rect">
+            <a:avLst/>
+          </a:prstGeom>
+          <a:noFill/>
+        </p:spPr>
+        <p:txBody>
+          <a:bodyPr wrap="square" rtlCol="0">
+            <a:spAutoFit/>
+          </a:bodyPr>
+          <a:lstStyle/>
+          <a:p>
+            <a:r>
+              <a:rPr lang="en-GB" sz="1400" dirty="0">
+                <a:latin typeface="Arial" panose="020B0604020202020204" pitchFamily="34" charset="0"/>
+                <a:cs typeface="Arial" panose="020B0604020202020204" pitchFamily="34" charset="0"/>
+              </a:rPr>
+              <a:t>The phases for LSOAs were broadly classed either a significant ‘increase’, ‘decrease’ or not significant all in ASB during those periods. These were extracted and plotted on to the map of Nottingham for interpretation. </a:t>
+            </a:r>
+          </a:p>
+        </p:txBody>
+      </p:sp>
+      <p:sp>
+        <p:nvSpPr>
+          <p:cNvPr id="11" name="Slide Number Placeholder 3">
+            <a:extLst>
+              <a:ext uri="{FF2B5EF4-FFF2-40B4-BE49-F238E27FC236}">
+                <a16:creationId xmlns:a16="http://schemas.microsoft.com/office/drawing/2014/main" id="{58F02A6F-C799-1040-203C-F99182B2DC7C}"/>
+              </a:ext>
+            </a:extLst>
+          </p:cNvPr>
+          <p:cNvSpPr txBox="1">
+            <a:spLocks/>
+          </p:cNvSpPr>
+          <p:nvPr/>
+        </p:nvSpPr>
+        <p:spPr>
+          <a:xfrm>
+            <a:off x="11652000" y="6439971"/>
+            <a:ext cx="540000" cy="144000"/>
+          </a:xfrm>
+          <a:prstGeom prst="rect">
+            <a:avLst/>
+          </a:prstGeom>
+        </p:spPr>
+        <p:txBody>
+          <a:bodyPr/>
+          <a:lstStyle>
+            <a:defPPr>
+              <a:defRPr lang="en-US"/>
+            </a:defPPr>
+            <a:lvl1pPr marL="0" algn="l" defTabSz="914400" rtl="0" eaLnBrk="1" latinLnBrk="0" hangingPunct="1">
+              <a:defRPr sz="1800" kern="1200">
+                <a:solidFill>
+                  <a:schemeClr val="tx1"/>
+                </a:solidFill>
+                <a:latin typeface="+mn-lt"/>
+                <a:ea typeface="+mn-ea"/>
+                <a:cs typeface="+mn-cs"/>
+              </a:defRPr>
+            </a:lvl1pPr>
+            <a:lvl2pPr marL="457200" algn="l" defTabSz="914400" rtl="0" eaLnBrk="1" latinLnBrk="0" hangingPunct="1">
+              <a:defRPr sz="1800" kern="1200">
+                <a:solidFill>
+                  <a:schemeClr val="tx1"/>
+                </a:solidFill>
+                <a:latin typeface="+mn-lt"/>
+                <a:ea typeface="+mn-ea"/>
+                <a:cs typeface="+mn-cs"/>
+              </a:defRPr>
+            </a:lvl2pPr>
+            <a:lvl3pPr marL="914400" algn="l" defTabSz="914400" rtl="0" eaLnBrk="1" latinLnBrk="0" hangingPunct="1">
+              <a:defRPr sz="1800" kern="1200">
+                <a:solidFill>
+                  <a:schemeClr val="tx1"/>
+                </a:solidFill>
+                <a:latin typeface="+mn-lt"/>
+                <a:ea typeface="+mn-ea"/>
+                <a:cs typeface="+mn-cs"/>
+              </a:defRPr>
+            </a:lvl3pPr>
+            <a:lvl4pPr marL="1371600" algn="l" defTabSz="914400" rtl="0" eaLnBrk="1" latinLnBrk="0" hangingPunct="1">
+              <a:defRPr sz="1800" kern="1200">
+                <a:solidFill>
+                  <a:schemeClr val="tx1"/>
+                </a:solidFill>
+                <a:latin typeface="+mn-lt"/>
+                <a:ea typeface="+mn-ea"/>
+                <a:cs typeface="+mn-cs"/>
+              </a:defRPr>
+            </a:lvl4pPr>
+            <a:lvl5pPr marL="1828800" algn="l" defTabSz="914400" rtl="0" eaLnBrk="1" latinLnBrk="0" hangingPunct="1">
+              <a:defRPr sz="1800" kern="1200">
+                <a:solidFill>
+                  <a:schemeClr val="tx1"/>
+                </a:solidFill>
+                <a:latin typeface="+mn-lt"/>
+                <a:ea typeface="+mn-ea"/>
+                <a:cs typeface="+mn-cs"/>
+              </a:defRPr>
+            </a:lvl5pPr>
+            <a:lvl6pPr marL="2286000" algn="l" defTabSz="914400" rtl="0" eaLnBrk="1" latinLnBrk="0" hangingPunct="1">
+              <a:defRPr sz="1800" kern="1200">
+                <a:solidFill>
+                  <a:schemeClr val="tx1"/>
+                </a:solidFill>
+                <a:latin typeface="+mn-lt"/>
+                <a:ea typeface="+mn-ea"/>
+                <a:cs typeface="+mn-cs"/>
+              </a:defRPr>
+            </a:lvl6pPr>
+            <a:lvl7pPr marL="2743200" algn="l" defTabSz="914400" rtl="0" eaLnBrk="1" latinLnBrk="0" hangingPunct="1">
+              <a:defRPr sz="1800" kern="1200">
+                <a:solidFill>
+                  <a:schemeClr val="tx1"/>
+                </a:solidFill>
+                <a:latin typeface="+mn-lt"/>
+                <a:ea typeface="+mn-ea"/>
+                <a:cs typeface="+mn-cs"/>
+              </a:defRPr>
+            </a:lvl7pPr>
+            <a:lvl8pPr marL="3200400" algn="l" defTabSz="914400" rtl="0" eaLnBrk="1" latinLnBrk="0" hangingPunct="1">
+              <a:defRPr sz="1800" kern="1200">
+                <a:solidFill>
+                  <a:schemeClr val="tx1"/>
+                </a:solidFill>
+                <a:latin typeface="+mn-lt"/>
+                <a:ea typeface="+mn-ea"/>
+                <a:cs typeface="+mn-cs"/>
+              </a:defRPr>
+            </a:lvl8pPr>
+            <a:lvl9pPr marL="3657600" algn="l" defTabSz="914400" rtl="0" eaLnBrk="1" latinLnBrk="0" hangingPunct="1">
+              <a:defRPr sz="1800" kern="1200">
+                <a:solidFill>
+                  <a:schemeClr val="tx1"/>
+                </a:solidFill>
+                <a:latin typeface="+mn-lt"/>
+                <a:ea typeface="+mn-ea"/>
+                <a:cs typeface="+mn-cs"/>
+              </a:defRPr>
+            </a:lvl9pPr>
+          </a:lstStyle>
+          <a:p>
+            <a:fld id="{6C21D7B2-F6DF-4749-BE48-6DFE0A2356E7}" type="slidenum">
+              <a:rPr lang="en-US" altLang="x-none" smtClean="0">
+                <a:latin typeface="Helvetica Neue" panose="02000503000000020004" pitchFamily="2" charset="0"/>
+                <a:ea typeface="Helvetica Neue" panose="02000503000000020004" pitchFamily="2" charset="0"/>
+                <a:cs typeface="Helvetica Neue" panose="02000503000000020004" pitchFamily="2" charset="0"/>
+              </a:rPr>
+              <a:pPr/>
+              <a:t>29</a:t>
+            </a:fld>
+            <a:endParaRPr lang="en-US" altLang="x-none" dirty="0">
+              <a:latin typeface="Helvetica Neue" panose="02000503000000020004" pitchFamily="2" charset="0"/>
+              <a:ea typeface="Helvetica Neue" panose="02000503000000020004" pitchFamily="2" charset="0"/>
+              <a:cs typeface="Helvetica Neue" panose="02000503000000020004" pitchFamily="2" charset="0"/>
+            </a:endParaRPr>
+          </a:p>
+        </p:txBody>
+      </p:sp>
+    </p:spTree>
+    <p:extLst>
+      <p:ext uri="{BB962C8B-B14F-4D97-AF65-F5344CB8AC3E}">
+        <p14:creationId xmlns:p14="http://schemas.microsoft.com/office/powerpoint/2010/main" val="3970609898"/>
+      </p:ext>
+    </p:extLst>
+  </p:cSld>
+  <p:clrMapOvr>
+    <a:masterClrMapping/>
+  </p:clrMapOvr>
+</p:sld>
+</file>
+
+<file path=ppt/slides/slide3.xml><?xml version="1.0" encoding="utf-8"?>
+<p:sld xmlns:a="http://schemas.openxmlformats.org/drawingml/2006/main" xmlns:r="http://schemas.openxmlformats.org/officeDocument/2006/relationships" xmlns:p="http://schemas.openxmlformats.org/presentationml/2006/main">
+  <p:cSld>
+    <p:spTree>
+      <p:nvGrpSpPr>
+        <p:cNvPr id="1" name=""/>
+        <p:cNvGrpSpPr/>
+        <p:nvPr/>
+      </p:nvGrpSpPr>
+      <p:grpSpPr>
+        <a:xfrm>
+          <a:off x="0" y="0"/>
+          <a:ext cx="0" cy="0"/>
+          <a:chOff x="0" y="0"/>
+          <a:chExt cx="0" cy="0"/>
+        </a:xfrm>
+      </p:grpSpPr>
+      <p:sp>
+        <p:nvSpPr>
+          <p:cNvPr id="2" name="Rectangle 1">
+            <a:extLst>
+              <a:ext uri="{FF2B5EF4-FFF2-40B4-BE49-F238E27FC236}">
+                <a16:creationId xmlns:a16="http://schemas.microsoft.com/office/drawing/2014/main" id="{083ACA4B-420E-864E-A288-C901C26F4670}"/>
+              </a:ext>
+            </a:extLst>
+          </p:cNvPr>
+          <p:cNvSpPr/>
+          <p:nvPr/>
+        </p:nvSpPr>
+        <p:spPr>
+          <a:xfrm>
+            <a:off x="0" y="0"/>
+            <a:ext cx="12192000" cy="6858000"/>
+          </a:xfrm>
+          <a:prstGeom prst="rect">
+            <a:avLst/>
+          </a:prstGeom>
+          <a:solidFill>
+            <a:schemeClr val="bg2">
+              <a:lumMod val="75000"/>
+            </a:schemeClr>
+          </a:solidFill>
+          <a:ln>
+            <a:solidFill>
+              <a:srgbClr val="009193"/>
+            </a:solidFill>
+          </a:ln>
+        </p:spPr>
+        <p:style>
+          <a:lnRef idx="2">
+            <a:schemeClr val="accent1">
+              <a:shade val="50000"/>
+            </a:schemeClr>
+          </a:lnRef>
+          <a:fillRef idx="1">
+            <a:schemeClr val="accent1"/>
+          </a:fillRef>
+          <a:effectRef idx="0">
+            <a:schemeClr val="accent1"/>
+          </a:effectRef>
+          <a:fontRef idx="minor">
+            <a:schemeClr val="lt1"/>
+          </a:fontRef>
+        </p:style>
+        <p:txBody>
+          <a:bodyPr rtlCol="0" anchor="ctr"/>
+          <a:lstStyle/>
+          <a:p>
+            <a:pPr algn="ctr"/>
+            <a:endParaRPr lang="en-US"/>
+          </a:p>
+        </p:txBody>
+      </p:sp>
+      <p:sp>
+        <p:nvSpPr>
+          <p:cNvPr id="5" name="Title 1">
+            <a:extLst>
+              <a:ext uri="{FF2B5EF4-FFF2-40B4-BE49-F238E27FC236}">
+                <a16:creationId xmlns:a16="http://schemas.microsoft.com/office/drawing/2014/main" id="{C76F1414-123F-A64D-A741-24140E769A2A}"/>
+              </a:ext>
+            </a:extLst>
+          </p:cNvPr>
+          <p:cNvSpPr>
+            <a:spLocks noGrp="1"/>
+          </p:cNvSpPr>
+          <p:nvPr>
+            <p:ph type="title"/>
+          </p:nvPr>
+        </p:nvSpPr>
+        <p:spPr>
+          <a:xfrm>
+            <a:off x="582798" y="2946857"/>
+            <a:ext cx="11233150" cy="1296988"/>
+          </a:xfrm>
+        </p:spPr>
+        <p:txBody>
+          <a:bodyPr/>
+          <a:lstStyle/>
+          <a:p>
+            <a:pPr>
+              <a:defRPr/>
+            </a:pPr>
+            <a:r>
+              <a:rPr lang="en-US" sz="3600" b="1" dirty="0">
+                <a:solidFill>
+                  <a:schemeClr val="bg1"/>
+                </a:solidFill>
+                <a:latin typeface="Helvetica Neue Light" panose="02000403000000020004" pitchFamily="2" charset="0"/>
+                <a:ea typeface="Helvetica Neue Light" panose="02000403000000020004" pitchFamily="2" charset="0"/>
+              </a:rPr>
+              <a:t>Remember in Week 2’s we covered…</a:t>
+            </a:r>
+          </a:p>
+        </p:txBody>
+      </p:sp>
+      <p:sp>
+        <p:nvSpPr>
+          <p:cNvPr id="3" name="Slide Number Placeholder 3">
+            <a:extLst>
+              <a:ext uri="{FF2B5EF4-FFF2-40B4-BE49-F238E27FC236}">
+                <a16:creationId xmlns:a16="http://schemas.microsoft.com/office/drawing/2014/main" id="{2D0EC806-25B8-E235-249E-739DA45A8779}"/>
+              </a:ext>
+            </a:extLst>
+          </p:cNvPr>
+          <p:cNvSpPr txBox="1">
+            <a:spLocks/>
+          </p:cNvSpPr>
+          <p:nvPr/>
+        </p:nvSpPr>
+        <p:spPr>
+          <a:xfrm>
+            <a:off x="11652000" y="6439971"/>
+            <a:ext cx="540000" cy="144000"/>
+          </a:xfrm>
+          <a:prstGeom prst="rect">
+            <a:avLst/>
+          </a:prstGeom>
+        </p:spPr>
+        <p:txBody>
+          <a:bodyPr/>
+          <a:lstStyle>
+            <a:defPPr>
+              <a:defRPr lang="en-US"/>
+            </a:defPPr>
+            <a:lvl1pPr marL="0" algn="l" defTabSz="914400" rtl="0" eaLnBrk="1" latinLnBrk="0" hangingPunct="1">
+              <a:defRPr sz="1800" kern="1200">
+                <a:solidFill>
+                  <a:schemeClr val="tx1"/>
+                </a:solidFill>
+                <a:latin typeface="+mn-lt"/>
+                <a:ea typeface="+mn-ea"/>
+                <a:cs typeface="+mn-cs"/>
+              </a:defRPr>
+            </a:lvl1pPr>
+            <a:lvl2pPr marL="457200" algn="l" defTabSz="914400" rtl="0" eaLnBrk="1" latinLnBrk="0" hangingPunct="1">
+              <a:defRPr sz="1800" kern="1200">
+                <a:solidFill>
+                  <a:schemeClr val="tx1"/>
+                </a:solidFill>
+                <a:latin typeface="+mn-lt"/>
+                <a:ea typeface="+mn-ea"/>
+                <a:cs typeface="+mn-cs"/>
+              </a:defRPr>
+            </a:lvl2pPr>
+            <a:lvl3pPr marL="914400" algn="l" defTabSz="914400" rtl="0" eaLnBrk="1" latinLnBrk="0" hangingPunct="1">
+              <a:defRPr sz="1800" kern="1200">
+                <a:solidFill>
+                  <a:schemeClr val="tx1"/>
+                </a:solidFill>
+                <a:latin typeface="+mn-lt"/>
+                <a:ea typeface="+mn-ea"/>
+                <a:cs typeface="+mn-cs"/>
+              </a:defRPr>
+            </a:lvl3pPr>
+            <a:lvl4pPr marL="1371600" algn="l" defTabSz="914400" rtl="0" eaLnBrk="1" latinLnBrk="0" hangingPunct="1">
+              <a:defRPr sz="1800" kern="1200">
+                <a:solidFill>
+                  <a:schemeClr val="tx1"/>
+                </a:solidFill>
+                <a:latin typeface="+mn-lt"/>
+                <a:ea typeface="+mn-ea"/>
+                <a:cs typeface="+mn-cs"/>
+              </a:defRPr>
+            </a:lvl4pPr>
+            <a:lvl5pPr marL="1828800" algn="l" defTabSz="914400" rtl="0" eaLnBrk="1" latinLnBrk="0" hangingPunct="1">
+              <a:defRPr sz="1800" kern="1200">
+                <a:solidFill>
+                  <a:schemeClr val="tx1"/>
+                </a:solidFill>
+                <a:latin typeface="+mn-lt"/>
+                <a:ea typeface="+mn-ea"/>
+                <a:cs typeface="+mn-cs"/>
+              </a:defRPr>
+            </a:lvl5pPr>
+            <a:lvl6pPr marL="2286000" algn="l" defTabSz="914400" rtl="0" eaLnBrk="1" latinLnBrk="0" hangingPunct="1">
+              <a:defRPr sz="1800" kern="1200">
+                <a:solidFill>
+                  <a:schemeClr val="tx1"/>
+                </a:solidFill>
+                <a:latin typeface="+mn-lt"/>
+                <a:ea typeface="+mn-ea"/>
+                <a:cs typeface="+mn-cs"/>
+              </a:defRPr>
+            </a:lvl6pPr>
+            <a:lvl7pPr marL="2743200" algn="l" defTabSz="914400" rtl="0" eaLnBrk="1" latinLnBrk="0" hangingPunct="1">
+              <a:defRPr sz="1800" kern="1200">
+                <a:solidFill>
+                  <a:schemeClr val="tx1"/>
+                </a:solidFill>
+                <a:latin typeface="+mn-lt"/>
+                <a:ea typeface="+mn-ea"/>
+                <a:cs typeface="+mn-cs"/>
+              </a:defRPr>
+            </a:lvl7pPr>
+            <a:lvl8pPr marL="3200400" algn="l" defTabSz="914400" rtl="0" eaLnBrk="1" latinLnBrk="0" hangingPunct="1">
+              <a:defRPr sz="1800" kern="1200">
+                <a:solidFill>
+                  <a:schemeClr val="tx1"/>
+                </a:solidFill>
+                <a:latin typeface="+mn-lt"/>
+                <a:ea typeface="+mn-ea"/>
+                <a:cs typeface="+mn-cs"/>
+              </a:defRPr>
+            </a:lvl8pPr>
+            <a:lvl9pPr marL="3657600" algn="l" defTabSz="914400" rtl="0" eaLnBrk="1" latinLnBrk="0" hangingPunct="1">
+              <a:defRPr sz="1800" kern="1200">
+                <a:solidFill>
+                  <a:schemeClr val="tx1"/>
+                </a:solidFill>
+                <a:latin typeface="+mn-lt"/>
+                <a:ea typeface="+mn-ea"/>
+                <a:cs typeface="+mn-cs"/>
+              </a:defRPr>
+            </a:lvl9pPr>
+          </a:lstStyle>
+          <a:p>
+            <a:fld id="{6C21D7B2-F6DF-4749-BE48-6DFE0A2356E7}" type="slidenum">
+              <a:rPr lang="en-US" altLang="x-none" smtClean="0">
+                <a:latin typeface="Helvetica Neue" panose="02000503000000020004" pitchFamily="2" charset="0"/>
+                <a:ea typeface="Helvetica Neue" panose="02000503000000020004" pitchFamily="2" charset="0"/>
+                <a:cs typeface="Helvetica Neue" panose="02000503000000020004" pitchFamily="2" charset="0"/>
+              </a:rPr>
+              <a:pPr/>
+              <a:t>3</a:t>
+            </a:fld>
+            <a:endParaRPr lang="en-US" altLang="x-none" dirty="0">
+              <a:latin typeface="Helvetica Neue" panose="02000503000000020004" pitchFamily="2" charset="0"/>
+              <a:ea typeface="Helvetica Neue" panose="02000503000000020004" pitchFamily="2" charset="0"/>
+              <a:cs typeface="Helvetica Neue" panose="02000503000000020004" pitchFamily="2" charset="0"/>
+            </a:endParaRPr>
+          </a:p>
+        </p:txBody>
+      </p:sp>
+    </p:spTree>
+    <p:extLst>
+      <p:ext uri="{BB962C8B-B14F-4D97-AF65-F5344CB8AC3E}">
+        <p14:creationId xmlns:p14="http://schemas.microsoft.com/office/powerpoint/2010/main" val="3646708438"/>
+      </p:ext>
+    </p:extLst>
+  </p:cSld>
+  <p:clrMapOvr>
+    <a:masterClrMapping/>
+  </p:clrMapOvr>
+</p:sld>
+</file>
+
+<file path=ppt/slides/slide30.xml><?xml version="1.0" encoding="utf-8"?>
 <p:sld xmlns:a="http://schemas.openxmlformats.org/drawingml/2006/main" xmlns:r="http://schemas.openxmlformats.org/officeDocument/2006/relationships" xmlns:p="http://schemas.openxmlformats.org/presentationml/2006/main" showMasterSp="0">
   <p:cSld>
     <p:spTree>
@@ -35572,14 +36741,14 @@
           </a:prstGeom>
           <a:extLst>
             <a:ext uri="{909E8E84-426E-40dd-AFC4-6F175D3DCCD1}">
-              <a14:hiddenFill xmlns:a14="http://schemas.microsoft.com/office/drawing/2010/main" xmlns="">
+              <a14:hiddenFill xmlns="" xmlns:a14="http://schemas.microsoft.com/office/drawing/2010/main">
                 <a:solidFill>
                   <a:srgbClr val="FFFFFF"/>
                 </a:solidFill>
               </a14:hiddenFill>
             </a:ext>
             <a:ext uri="{91240B29-F687-4f45-9708-019B960494DF}">
-              <a14:hiddenLine xmlns:a14="http://schemas.microsoft.com/office/drawing/2010/main" xmlns="" w="9525">
+              <a14:hiddenLine xmlns="" xmlns:a14="http://schemas.microsoft.com/office/drawing/2010/main" w="9525">
                 <a:solidFill>
                   <a:srgbClr val="000000"/>
                 </a:solidFill>
@@ -35721,7 +36890,7 @@
                 <a:cs typeface="ＭＳ Ｐゴシック" charset="0"/>
               </a:rPr>
               <a:pPr eaLnBrk="1" hangingPunct="1"/>
-              <a:t>28</a:t>
+              <a:t>30</a:t>
             </a:fld>
             <a:endParaRPr lang="en-US" dirty="0">
               <a:solidFill>
@@ -35804,272 +36973,6 @@
     <p:extLst>
       <p:ext uri="{BB962C8B-B14F-4D97-AF65-F5344CB8AC3E}">
         <p14:creationId xmlns:p14="http://schemas.microsoft.com/office/powerpoint/2010/main" val="3930478435"/>
-      </p:ext>
-    </p:extLst>
-  </p:cSld>
-  <p:clrMapOvr>
-    <a:masterClrMapping/>
-  </p:clrMapOvr>
-</p:sld>
-</file>
-
-<file path=ppt/slides/slide3.xml><?xml version="1.0" encoding="utf-8"?>
-<p:sld xmlns:a="http://schemas.openxmlformats.org/drawingml/2006/main" xmlns:r="http://schemas.openxmlformats.org/officeDocument/2006/relationships" xmlns:p="http://schemas.openxmlformats.org/presentationml/2006/main">
-  <p:cSld>
-    <p:spTree>
-      <p:nvGrpSpPr>
-        <p:cNvPr id="1" name=""/>
-        <p:cNvGrpSpPr/>
-        <p:nvPr/>
-      </p:nvGrpSpPr>
-      <p:grpSpPr>
-        <a:xfrm>
-          <a:off x="0" y="0"/>
-          <a:ext cx="0" cy="0"/>
-          <a:chOff x="0" y="0"/>
-          <a:chExt cx="0" cy="0"/>
-        </a:xfrm>
-      </p:grpSpPr>
-      <p:sp>
-        <p:nvSpPr>
-          <p:cNvPr id="2" name="Rectangle 1">
-            <a:extLst>
-              <a:ext uri="{FF2B5EF4-FFF2-40B4-BE49-F238E27FC236}">
-                <a16:creationId xmlns:a16="http://schemas.microsoft.com/office/drawing/2014/main" id="{083ACA4B-420E-864E-A288-C901C26F4670}"/>
-              </a:ext>
-            </a:extLst>
-          </p:cNvPr>
-          <p:cNvSpPr/>
-          <p:nvPr/>
-        </p:nvSpPr>
-        <p:spPr>
-          <a:xfrm>
-            <a:off x="0" y="0"/>
-            <a:ext cx="12192000" cy="6858000"/>
-          </a:xfrm>
-          <a:prstGeom prst="rect">
-            <a:avLst/>
-          </a:prstGeom>
-          <a:solidFill>
-            <a:schemeClr val="bg2">
-              <a:lumMod val="75000"/>
-            </a:schemeClr>
-          </a:solidFill>
-          <a:ln>
-            <a:solidFill>
-              <a:srgbClr val="009193"/>
-            </a:solidFill>
-          </a:ln>
-        </p:spPr>
-        <p:style>
-          <a:lnRef idx="2">
-            <a:schemeClr val="accent1">
-              <a:shade val="50000"/>
-            </a:schemeClr>
-          </a:lnRef>
-          <a:fillRef idx="1">
-            <a:schemeClr val="accent1"/>
-          </a:fillRef>
-          <a:effectRef idx="0">
-            <a:schemeClr val="accent1"/>
-          </a:effectRef>
-          <a:fontRef idx="minor">
-            <a:schemeClr val="lt1"/>
-          </a:fontRef>
-        </p:style>
-        <p:txBody>
-          <a:bodyPr rtlCol="0" anchor="ctr"/>
-          <a:lstStyle/>
-          <a:p>
-            <a:pPr algn="ctr"/>
-            <a:endParaRPr lang="en-US"/>
-          </a:p>
-        </p:txBody>
-      </p:sp>
-      <p:sp>
-        <p:nvSpPr>
-          <p:cNvPr id="5" name="Title 1">
-            <a:extLst>
-              <a:ext uri="{FF2B5EF4-FFF2-40B4-BE49-F238E27FC236}">
-                <a16:creationId xmlns:a16="http://schemas.microsoft.com/office/drawing/2014/main" id="{C76F1414-123F-A64D-A741-24140E769A2A}"/>
-              </a:ext>
-            </a:extLst>
-          </p:cNvPr>
-          <p:cNvSpPr>
-            <a:spLocks noGrp="1"/>
-          </p:cNvSpPr>
-          <p:nvPr>
-            <p:ph type="title"/>
-          </p:nvPr>
-        </p:nvSpPr>
-        <p:spPr>
-          <a:xfrm>
-            <a:off x="582798" y="2946857"/>
-            <a:ext cx="11233150" cy="1296988"/>
-          </a:xfrm>
-        </p:spPr>
-        <p:txBody>
-          <a:bodyPr/>
-          <a:lstStyle/>
-          <a:p>
-            <a:pPr>
-              <a:defRPr/>
-            </a:pPr>
-            <a:r>
-              <a:rPr lang="en-US" sz="3600" b="1" dirty="0">
-                <a:solidFill>
-                  <a:schemeClr val="bg1"/>
-                </a:solidFill>
-                <a:latin typeface="Helvetica Neue Light" panose="02000403000000020004" pitchFamily="2" charset="0"/>
-                <a:ea typeface="Helvetica Neue Light" panose="02000403000000020004" pitchFamily="2" charset="0"/>
-              </a:rPr>
-              <a:t>Remember in Week 2’s we covered…</a:t>
-            </a:r>
-          </a:p>
-        </p:txBody>
-      </p:sp>
-      <p:sp>
-        <p:nvSpPr>
-          <p:cNvPr id="3" name="Slide Number Placeholder 3">
-            <a:extLst>
-              <a:ext uri="{FF2B5EF4-FFF2-40B4-BE49-F238E27FC236}">
-                <a16:creationId xmlns:a16="http://schemas.microsoft.com/office/drawing/2014/main" id="{2D0EC806-25B8-E235-249E-739DA45A8779}"/>
-              </a:ext>
-            </a:extLst>
-          </p:cNvPr>
-          <p:cNvSpPr txBox="1">
-            <a:spLocks/>
-          </p:cNvSpPr>
-          <p:nvPr/>
-        </p:nvSpPr>
-        <p:spPr>
-          <a:xfrm>
-            <a:off x="11652000" y="6439971"/>
-            <a:ext cx="540000" cy="144000"/>
-          </a:xfrm>
-          <a:prstGeom prst="rect">
-            <a:avLst/>
-          </a:prstGeom>
-        </p:spPr>
-        <p:txBody>
-          <a:bodyPr/>
-          <a:lstStyle>
-            <a:defPPr>
-              <a:defRPr lang="en-US"/>
-            </a:defPPr>
-            <a:lvl1pPr marL="0" algn="l" defTabSz="914400" rtl="0" eaLnBrk="1" latinLnBrk="0" hangingPunct="1">
-              <a:defRPr sz="1800" kern="1200">
-                <a:solidFill>
-                  <a:schemeClr val="tx1"/>
-                </a:solidFill>
-                <a:latin typeface="+mn-lt"/>
-                <a:ea typeface="+mn-ea"/>
-                <a:cs typeface="+mn-cs"/>
-              </a:defRPr>
-            </a:lvl1pPr>
-            <a:lvl2pPr marL="457200" algn="l" defTabSz="914400" rtl="0" eaLnBrk="1" latinLnBrk="0" hangingPunct="1">
-              <a:defRPr sz="1800" kern="1200">
-                <a:solidFill>
-                  <a:schemeClr val="tx1"/>
-                </a:solidFill>
-                <a:latin typeface="+mn-lt"/>
-                <a:ea typeface="+mn-ea"/>
-                <a:cs typeface="+mn-cs"/>
-              </a:defRPr>
-            </a:lvl2pPr>
-            <a:lvl3pPr marL="914400" algn="l" defTabSz="914400" rtl="0" eaLnBrk="1" latinLnBrk="0" hangingPunct="1">
-              <a:defRPr sz="1800" kern="1200">
-                <a:solidFill>
-                  <a:schemeClr val="tx1"/>
-                </a:solidFill>
-                <a:latin typeface="+mn-lt"/>
-                <a:ea typeface="+mn-ea"/>
-                <a:cs typeface="+mn-cs"/>
-              </a:defRPr>
-            </a:lvl3pPr>
-            <a:lvl4pPr marL="1371600" algn="l" defTabSz="914400" rtl="0" eaLnBrk="1" latinLnBrk="0" hangingPunct="1">
-              <a:defRPr sz="1800" kern="1200">
-                <a:solidFill>
-                  <a:schemeClr val="tx1"/>
-                </a:solidFill>
-                <a:latin typeface="+mn-lt"/>
-                <a:ea typeface="+mn-ea"/>
-                <a:cs typeface="+mn-cs"/>
-              </a:defRPr>
-            </a:lvl4pPr>
-            <a:lvl5pPr marL="1828800" algn="l" defTabSz="914400" rtl="0" eaLnBrk="1" latinLnBrk="0" hangingPunct="1">
-              <a:defRPr sz="1800" kern="1200">
-                <a:solidFill>
-                  <a:schemeClr val="tx1"/>
-                </a:solidFill>
-                <a:latin typeface="+mn-lt"/>
-                <a:ea typeface="+mn-ea"/>
-                <a:cs typeface="+mn-cs"/>
-              </a:defRPr>
-            </a:lvl5pPr>
-            <a:lvl6pPr marL="2286000" algn="l" defTabSz="914400" rtl="0" eaLnBrk="1" latinLnBrk="0" hangingPunct="1">
-              <a:defRPr sz="1800" kern="1200">
-                <a:solidFill>
-                  <a:schemeClr val="tx1"/>
-                </a:solidFill>
-                <a:latin typeface="+mn-lt"/>
-                <a:ea typeface="+mn-ea"/>
-                <a:cs typeface="+mn-cs"/>
-              </a:defRPr>
-            </a:lvl6pPr>
-            <a:lvl7pPr marL="2743200" algn="l" defTabSz="914400" rtl="0" eaLnBrk="1" latinLnBrk="0" hangingPunct="1">
-              <a:defRPr sz="1800" kern="1200">
-                <a:solidFill>
-                  <a:schemeClr val="tx1"/>
-                </a:solidFill>
-                <a:latin typeface="+mn-lt"/>
-                <a:ea typeface="+mn-ea"/>
-                <a:cs typeface="+mn-cs"/>
-              </a:defRPr>
-            </a:lvl7pPr>
-            <a:lvl8pPr marL="3200400" algn="l" defTabSz="914400" rtl="0" eaLnBrk="1" latinLnBrk="0" hangingPunct="1">
-              <a:defRPr sz="1800" kern="1200">
-                <a:solidFill>
-                  <a:schemeClr val="tx1"/>
-                </a:solidFill>
-                <a:latin typeface="+mn-lt"/>
-                <a:ea typeface="+mn-ea"/>
-                <a:cs typeface="+mn-cs"/>
-              </a:defRPr>
-            </a:lvl8pPr>
-            <a:lvl9pPr marL="3657600" algn="l" defTabSz="914400" rtl="0" eaLnBrk="1" latinLnBrk="0" hangingPunct="1">
-              <a:defRPr sz="1800" kern="1200">
-                <a:solidFill>
-                  <a:schemeClr val="tx1"/>
-                </a:solidFill>
-                <a:latin typeface="+mn-lt"/>
-                <a:ea typeface="+mn-ea"/>
-                <a:cs typeface="+mn-cs"/>
-              </a:defRPr>
-            </a:lvl9pPr>
-          </a:lstStyle>
-          <a:p>
-            <a:fld id="{6C21D7B2-F6DF-4749-BE48-6DFE0A2356E7}" type="slidenum">
-              <a:rPr lang="en-US" altLang="x-none" smtClean="0">
-                <a:latin typeface="Helvetica Neue" panose="02000503000000020004" pitchFamily="2" charset="0"/>
-                <a:ea typeface="Helvetica Neue" panose="02000503000000020004" pitchFamily="2" charset="0"/>
-                <a:cs typeface="Helvetica Neue" panose="02000503000000020004" pitchFamily="2" charset="0"/>
-              </a:rPr>
-              <a:pPr/>
-              <a:t>3</a:t>
-            </a:fld>
-            <a:endParaRPr lang="en-US" altLang="x-none" dirty="0">
-              <a:latin typeface="Helvetica Neue" panose="02000503000000020004" pitchFamily="2" charset="0"/>
-              <a:ea typeface="Helvetica Neue" panose="02000503000000020004" pitchFamily="2" charset="0"/>
-              <a:cs typeface="Helvetica Neue" panose="02000503000000020004" pitchFamily="2" charset="0"/>
-            </a:endParaRPr>
-          </a:p>
-        </p:txBody>
-      </p:sp>
-    </p:spTree>
-    <p:extLst>
-      <p:ext uri="{BB962C8B-B14F-4D97-AF65-F5344CB8AC3E}">
-        <p14:creationId xmlns:p14="http://schemas.microsoft.com/office/powerpoint/2010/main" val="3646708438"/>
       </p:ext>
     </p:extLst>
   </p:cSld>
@@ -37299,7 +38202,7 @@
         </p:nvGraphicFramePr>
         <p:xfrm>
           <a:off x="214312" y="2553816"/>
-          <a:ext cx="11763375" cy="3511132"/>
+          <a:ext cx="11763375" cy="3578831"/>
         </p:xfrm>
         <a:graphic>
           <a:graphicData uri="http://schemas.openxmlformats.org/drawingml/2006/table">
@@ -40189,7 +41092,7 @@
                 <a:ea typeface="Helvetica Neue Light" panose="02000403000000020004" pitchFamily="2" charset="0"/>
                 <a:cs typeface="Helvetica Neue" panose="02000503000000020004" pitchFamily="2" charset="0"/>
               </a:rPr>
-              <a:t>flexible generalization of ordinary any regression model</a:t>
+              <a:t>flexible generalization of any ordinary regression model</a:t>
             </a:r>
             <a:r>
               <a:rPr lang="en-GB" sz="1800" dirty="0">
@@ -41759,8 +42662,8 @@
           </p:sp>
         </mc:Fallback>
       </mc:AlternateContent>
-      <mc:AlternateContent xmlns:mc="http://schemas.openxmlformats.org/markup-compatibility/2006" xmlns:a14="http://schemas.microsoft.com/office/drawing/2010/main">
-        <mc:Choice Requires="a14">
+      <mc:AlternateContent xmlns:mc="http://schemas.openxmlformats.org/markup-compatibility/2006">
+        <mc:Choice xmlns:a14="http://schemas.microsoft.com/office/drawing/2010/main" Requires="a14">
           <p:sp>
             <p:nvSpPr>
               <p:cNvPr id="6" name="TextBox 5">
@@ -41775,8 +42678,8 @@
             </p:nvSpPr>
             <p:spPr>
               <a:xfrm>
-                <a:off x="315720" y="3666807"/>
-                <a:ext cx="9753190" cy="2905154"/>
+                <a:off x="315720" y="3453582"/>
+                <a:ext cx="9753190" cy="3182153"/>
               </a:xfrm>
               <a:prstGeom prst="rect">
                 <a:avLst/>
@@ -41820,7 +42723,7 @@
                     <a:latin typeface="Helvetica Neue Light" panose="02000403000000020004" pitchFamily="2" charset="0"/>
                     <a:ea typeface="Helvetica Neue Light" panose="02000403000000020004" pitchFamily="2" charset="0"/>
                   </a:rPr>
-                  <a:t>GAMs are much more relaxed in there assumptions about linearity. </a:t>
+                  <a:t>GAMs are much more relaxed in their assumptions about linearity. </a:t>
                 </a:r>
               </a:p>
               <a:p>
@@ -41993,13 +42896,13 @@
                     <a:latin typeface="Helvetica Neue Light" panose="02000403000000020004" pitchFamily="2" charset="0"/>
                     <a:ea typeface="Helvetica Neue Light" panose="02000403000000020004" pitchFamily="2" charset="0"/>
                   </a:rPr>
-                  <a:t>) which is still has some of the explainability of a linear regression    </a:t>
+                  <a:t>) which is still has some of the explainability of a generalised linear regression    </a:t>
                 </a:r>
               </a:p>
             </p:txBody>
           </p:sp>
         </mc:Choice>
-        <mc:Fallback xmlns="">
+        <mc:Fallback>
           <p:sp>
             <p:nvSpPr>
               <p:cNvPr id="6" name="TextBox 5">
@@ -42016,8 +42919,8 @@
             </p:nvSpPr>
             <p:spPr>
               <a:xfrm>
-                <a:off x="315720" y="3666807"/>
-                <a:ext cx="9753190" cy="2905154"/>
+                <a:off x="315720" y="3453582"/>
+                <a:ext cx="9753190" cy="3182153"/>
               </a:xfrm>
               <a:prstGeom prst="rect">
                 <a:avLst/>
@@ -42025,7 +42928,7 @@
               <a:blipFill>
                 <a:blip r:embed="rId5"/>
                 <a:stretch>
-                  <a:fillRect l="-519" t="-870" b="-2174"/>
+                  <a:fillRect l="-519" t="-791" b="-1581"/>
                 </a:stretch>
               </a:blipFill>
               <a:ln>

</xml_diff>

<commit_message>
Add updated lecture notes
</commit_message>
<xml_diff>
--- a/Lecture_notes_ppt/GEOG0125 Week 3 Lecture - Bayesian GAMs.pptx
+++ b/Lecture_notes_ppt/GEOG0125 Week 3 Lecture - Bayesian GAMs.pptx
@@ -13949,8 +13949,8 @@
           </a:p>
         </p:txBody>
       </p:sp>
-      <mc:AlternateContent xmlns:mc="http://schemas.openxmlformats.org/markup-compatibility/2006">
-        <mc:Choice xmlns:a14="http://schemas.microsoft.com/office/drawing/2010/main" Requires="a14">
+      <mc:AlternateContent xmlns:mc="http://schemas.openxmlformats.org/markup-compatibility/2006" xmlns:a14="http://schemas.microsoft.com/office/drawing/2010/main">
+        <mc:Choice Requires="a14">
           <p:sp>
             <p:nvSpPr>
               <p:cNvPr id="6" name="TextBox 5">
@@ -14111,7 +14111,7 @@
             </p:txBody>
           </p:sp>
         </mc:Choice>
-        <mc:Fallback>
+        <mc:Fallback xmlns="">
           <p:sp>
             <p:nvSpPr>
               <p:cNvPr id="6" name="TextBox 5">
@@ -29318,8 +29318,8 @@
           </a:p>
         </p:txBody>
       </p:sp>
-      <mc:AlternateContent xmlns:mc="http://schemas.openxmlformats.org/markup-compatibility/2006">
-        <mc:Choice xmlns:a14="http://schemas.microsoft.com/office/drawing/2010/main" Requires="a14">
+      <mc:AlternateContent xmlns:mc="http://schemas.openxmlformats.org/markup-compatibility/2006" xmlns:a14="http://schemas.microsoft.com/office/drawing/2010/main">
+        <mc:Choice Requires="a14">
           <p:sp>
             <p:nvSpPr>
               <p:cNvPr id="28" name="TextBox 27">
@@ -29395,7 +29395,7 @@
             </p:txBody>
           </p:sp>
         </mc:Choice>
-        <mc:Fallback>
+        <mc:Fallback xmlns="">
           <p:sp>
             <p:nvSpPr>
               <p:cNvPr id="28" name="TextBox 27">
@@ -35800,8 +35800,8 @@
         </p:nvSpPr>
         <p:spPr>
           <a:xfrm>
-            <a:off x="218661" y="107059"/>
-            <a:ext cx="10198554" cy="954107"/>
+            <a:off x="218660" y="107059"/>
+            <a:ext cx="11705116" cy="707886"/>
           </a:xfrm>
           <a:prstGeom prst="rect">
             <a:avLst/>
@@ -35816,11 +35816,11 @@
           <a:p>
             <a:pPr algn="l"/>
             <a:r>
-              <a:rPr lang="en-GB" sz="2800" b="1" dirty="0">
+              <a:rPr lang="en-GB" sz="2000" b="1" dirty="0">
                 <a:latin typeface="Helvetica Neue Light" panose="02000403000000020004" pitchFamily="2" charset="0"/>
                 <a:ea typeface="Helvetica Neue Light" panose="02000403000000020004" pitchFamily="2" charset="0"/>
               </a:rPr>
-              <a:t>Example 2: COVID-19 lockdown phases and impact on crime resurgence in Nottingham (Antisocial Behaviour [ASB])</a:t>
+              <a:t>Example 2: COVID-19 lockdown phases and impact on crime resurgence in Nottingham (Antisocial Behaviour [ASB]) [1]</a:t>
             </a:r>
           </a:p>
         </p:txBody>
@@ -35847,7 +35847,7 @@
         </p:blipFill>
         <p:spPr>
           <a:xfrm>
-            <a:off x="129569" y="1399750"/>
+            <a:off x="129569" y="1107347"/>
             <a:ext cx="11932862" cy="2987065"/>
           </a:xfrm>
           <a:prstGeom prst="rect">
@@ -35869,8 +35869,8 @@
         </p:nvSpPr>
         <p:spPr>
           <a:xfrm>
-            <a:off x="218661" y="4443896"/>
-            <a:ext cx="11705115" cy="923330"/>
+            <a:off x="218661" y="4386815"/>
+            <a:ext cx="11705115" cy="1200329"/>
           </a:xfrm>
           <a:prstGeom prst="rect">
             <a:avLst/>
@@ -35892,7 +35892,7 @@
                 <a:latin typeface="Arial" panose="020B0604020202020204" pitchFamily="34" charset="0"/>
                 <a:cs typeface="Arial" panose="020B0604020202020204" pitchFamily="34" charset="0"/>
               </a:rPr>
-              <a:t>Understand the crime recovery patterns in-between the lockdown phases in Nottingham across all 182 LSOAs.</a:t>
+              <a:t>Understand the geospatial crime recovery patterns for the incidence of Antisocial Behaviour (ASB) events in-between the different lockdown phases in Nottingham across all 182 LSOAs.</a:t>
             </a:r>
           </a:p>
           <a:p>
@@ -35905,7 +35905,7 @@
                 <a:latin typeface="Arial" panose="020B0604020202020204" pitchFamily="34" charset="0"/>
                 <a:cs typeface="Arial" panose="020B0604020202020204" pitchFamily="34" charset="0"/>
               </a:rPr>
-              <a:t>To examine whether or not these ASB patterns were statistically significant. Hence a stratified Poisson GAM model was used </a:t>
+              <a:t>To examine whether these ASB patterns were statistically significant. Hence a stratified Poisson GAM model was used for each LSOA. </a:t>
             </a:r>
           </a:p>
         </p:txBody>
@@ -35924,7 +35924,7 @@
         </p:nvSpPr>
         <p:spPr>
           <a:xfrm>
-            <a:off x="218661" y="5641988"/>
+            <a:off x="218661" y="5651868"/>
             <a:ext cx="8449851" cy="738664"/>
           </a:xfrm>
           <a:prstGeom prst="rect">
@@ -35955,8 +35955,20 @@
                 <a:latin typeface="Arial" panose="020B0604020202020204" pitchFamily="34" charset="0"/>
                 <a:cs typeface="Arial" panose="020B0604020202020204" pitchFamily="34" charset="0"/>
               </a:rPr>
-              <a:t>Download: [Click]</a:t>
-            </a:r>
+              <a:t>Download: </a:t>
+            </a:r>
+            <a:r>
+              <a:rPr lang="en-GB" sz="1400" b="1" dirty="0">
+                <a:latin typeface="Arial" panose="020B0604020202020204" pitchFamily="34" charset="0"/>
+                <a:cs typeface="Arial" panose="020B0604020202020204" pitchFamily="34" charset="0"/>
+                <a:hlinkClick r:id="rId3"/>
+              </a:rPr>
+              <a:t>[Click]</a:t>
+            </a:r>
+            <a:endParaRPr lang="en-GB" sz="1400" b="1" dirty="0">
+              <a:latin typeface="Arial" panose="020B0604020202020204" pitchFamily="34" charset="0"/>
+              <a:cs typeface="Arial" panose="020B0604020202020204" pitchFamily="34" charset="0"/>
+            </a:endParaRPr>
           </a:p>
         </p:txBody>
       </p:sp>
@@ -35974,7 +35986,7 @@
         </p:nvSpPr>
         <p:spPr>
           <a:xfrm>
-            <a:off x="218661" y="6399305"/>
+            <a:off x="218661" y="6485312"/>
             <a:ext cx="5397631" cy="307777"/>
           </a:xfrm>
           <a:prstGeom prst="rect">
@@ -35999,7 +36011,7 @@
               <a:rPr lang="en-GB" sz="1400" dirty="0">
                 <a:latin typeface="Arial" panose="020B0604020202020204" pitchFamily="34" charset="0"/>
                 <a:cs typeface="Arial" panose="020B0604020202020204" pitchFamily="34" charset="0"/>
-                <a:hlinkClick r:id="rId3"/>
+                <a:hlinkClick r:id="rId4"/>
               </a:rPr>
               <a:t>https://github.com/qghuihuihui/Dissertation-2023</a:t>
             </a:r>
@@ -36065,7 +36077,7 @@
         </p:blipFill>
         <p:spPr>
           <a:xfrm>
-            <a:off x="853440" y="770439"/>
+            <a:off x="853439" y="985731"/>
             <a:ext cx="4242816" cy="1062073"/>
           </a:xfrm>
           <a:prstGeom prst="rect">
@@ -36095,7 +36107,7 @@
         </p:blipFill>
         <p:spPr>
           <a:xfrm>
-            <a:off x="0" y="1832512"/>
+            <a:off x="-1" y="2047804"/>
             <a:ext cx="5627558" cy="3233674"/>
           </a:xfrm>
           <a:prstGeom prst="rect">
@@ -36117,7 +36129,7 @@
         </p:nvSpPr>
         <p:spPr>
           <a:xfrm rot="16200000">
-            <a:off x="-1090651" y="3039461"/>
+            <a:off x="-1090652" y="3254753"/>
             <a:ext cx="2489079" cy="307777"/>
           </a:xfrm>
           <a:prstGeom prst="rect">
@@ -36154,7 +36166,7 @@
         </p:nvSpPr>
         <p:spPr>
           <a:xfrm>
-            <a:off x="1044961" y="4758409"/>
+            <a:off x="1044960" y="4973701"/>
             <a:ext cx="3537635" cy="307777"/>
           </a:xfrm>
           <a:prstGeom prst="rect">
@@ -36199,7 +36211,7 @@
         </p:blipFill>
         <p:spPr>
           <a:xfrm>
-            <a:off x="5519507" y="743713"/>
+            <a:off x="5627556" y="814945"/>
             <a:ext cx="6526190" cy="4511039"/>
           </a:xfrm>
           <a:prstGeom prst="rect">
@@ -36421,6 +36433,45 @@
           </a:p>
         </p:txBody>
       </p:sp>
+      <p:sp>
+        <p:nvSpPr>
+          <p:cNvPr id="12" name="TextBox 11">
+            <a:extLst>
+              <a:ext uri="{FF2B5EF4-FFF2-40B4-BE49-F238E27FC236}">
+                <a16:creationId xmlns:a16="http://schemas.microsoft.com/office/drawing/2014/main" id="{AF34FA13-9446-D368-CAA1-33283A0CF6CE}"/>
+              </a:ext>
+            </a:extLst>
+          </p:cNvPr>
+          <p:cNvSpPr txBox="1"/>
+          <p:nvPr/>
+        </p:nvSpPr>
+        <p:spPr>
+          <a:xfrm>
+            <a:off x="218660" y="107059"/>
+            <a:ext cx="11705116" cy="707886"/>
+          </a:xfrm>
+          <a:prstGeom prst="rect">
+            <a:avLst/>
+          </a:prstGeom>
+          <a:noFill/>
+        </p:spPr>
+        <p:txBody>
+          <a:bodyPr wrap="square" rtlCol="0">
+            <a:spAutoFit/>
+          </a:bodyPr>
+          <a:lstStyle/>
+          <a:p>
+            <a:pPr algn="l"/>
+            <a:r>
+              <a:rPr lang="en-GB" sz="2000" b="1" dirty="0">
+                <a:latin typeface="Helvetica Neue Light" panose="02000403000000020004" pitchFamily="2" charset="0"/>
+                <a:ea typeface="Helvetica Neue Light" panose="02000403000000020004" pitchFamily="2" charset="0"/>
+              </a:rPr>
+              <a:t>Example 2: COVID-19 lockdown phases and impact on crime resurgence in Nottingham (Antisocial Behaviour [ASB]) [2]</a:t>
+            </a:r>
+          </a:p>
+        </p:txBody>
+      </p:sp>
     </p:spTree>
     <p:extLst>
       <p:ext uri="{BB962C8B-B14F-4D97-AF65-F5344CB8AC3E}">
@@ -36741,14 +36792,14 @@
           </a:prstGeom>
           <a:extLst>
             <a:ext uri="{909E8E84-426E-40dd-AFC4-6F175D3DCCD1}">
-              <a14:hiddenFill xmlns="" xmlns:a14="http://schemas.microsoft.com/office/drawing/2010/main">
+              <a14:hiddenFill xmlns:a14="http://schemas.microsoft.com/office/drawing/2010/main" xmlns="">
                 <a:solidFill>
                   <a:srgbClr val="FFFFFF"/>
                 </a:solidFill>
               </a14:hiddenFill>
             </a:ext>
             <a:ext uri="{91240B29-F687-4f45-9708-019B960494DF}">
-              <a14:hiddenLine xmlns="" xmlns:a14="http://schemas.microsoft.com/office/drawing/2010/main" w="9525">
+              <a14:hiddenLine xmlns:a14="http://schemas.microsoft.com/office/drawing/2010/main" xmlns="" w="9525">
                 <a:solidFill>
                   <a:srgbClr val="000000"/>
                 </a:solidFill>
@@ -42662,8 +42713,8 @@
           </p:sp>
         </mc:Fallback>
       </mc:AlternateContent>
-      <mc:AlternateContent xmlns:mc="http://schemas.openxmlformats.org/markup-compatibility/2006">
-        <mc:Choice xmlns:a14="http://schemas.microsoft.com/office/drawing/2010/main" Requires="a14">
+      <mc:AlternateContent xmlns:mc="http://schemas.openxmlformats.org/markup-compatibility/2006" xmlns:a14="http://schemas.microsoft.com/office/drawing/2010/main">
+        <mc:Choice Requires="a14">
           <p:sp>
             <p:nvSpPr>
               <p:cNvPr id="6" name="TextBox 5">
@@ -42902,7 +42953,7 @@
             </p:txBody>
           </p:sp>
         </mc:Choice>
-        <mc:Fallback>
+        <mc:Fallback xmlns="">
           <p:sp>
             <p:nvSpPr>
               <p:cNvPr id="6" name="TextBox 5">

</xml_diff>